<commit_message>
Update poster and search-words.component
</commit_message>
<xml_diff>
--- a/Posters/Spring2023/Evers-Perez.pptx
+++ b/Posters/Spring2023/Evers-Perez.pptx
@@ -10,7 +10,7 @@
   <p:sldIdLst>
     <p:sldId id="256" r:id="rId2"/>
   </p:sldIdLst>
-  <p:sldSz cx="43891200" cy="32918400"/>
+  <p:sldSz cx="43891200" cy="43891200"/>
   <p:notesSz cx="6858000" cy="9144000"/>
   <p:embeddedFontLst>
     <p:embeddedFont>
@@ -265,8 +265,11 @@
     </a:lvl9pPr>
   </p:defaultTextStyle>
   <p:extLst>
+    <p:ext uri="{EFAFB233-063F-42B5-8137-9DF3F51BA10A}">
+      <p15:sldGuideLst xmlns:p15="http://schemas.microsoft.com/office/powerpoint/2012/main"/>
+    </p:ext>
     <p:ext uri="http://customooxmlschemas.google.com/">
-      <go:slidesCustomData xmlns:go="http://customooxmlschemas.google.com/" xmlns:ahyp="http://schemas.microsoft.com/office/drawing/2018/hyperlinkcolor" xmlns:p15="http://schemas.microsoft.com/office/powerpoint/2012/main" xmlns:p14="http://schemas.microsoft.com/office/powerpoint/2010/main" xmlns:com="http://schemas.openxmlformats.org/drawingml/2006/compatibility" xmlns:pvml="urn:schemas-microsoft-com:office:powerpoint" xmlns:v="urn:schemas-microsoft-com:vml" xmlns:o="urn:schemas-microsoft-com:office:office" xmlns:dgm="http://schemas.openxmlformats.org/drawingml/2006/diagram" xmlns:c="http://schemas.openxmlformats.org/drawingml/2006/chart" xmlns:mv="urn:schemas-microsoft-com:mac:vml" xmlns:mc="http://schemas.openxmlformats.org/markup-compatibility/2006" xmlns="" r:id="rId16" roundtripDataSignature="AMtx7mj/K9O75hokTQceftHcE7ALSv6skA=="/>
+      <go:slidesCustomData xmlns="" xmlns:mc="http://schemas.openxmlformats.org/markup-compatibility/2006" xmlns:mv="urn:schemas-microsoft-com:mac:vml" xmlns:c="http://schemas.openxmlformats.org/drawingml/2006/chart" xmlns:dgm="http://schemas.openxmlformats.org/drawingml/2006/diagram" xmlns:o="urn:schemas-microsoft-com:office:office" xmlns:v="urn:schemas-microsoft-com:vml" xmlns:pvml="urn:schemas-microsoft-com:office:powerpoint" xmlns:com="http://schemas.openxmlformats.org/drawingml/2006/compatibility" xmlns:p14="http://schemas.microsoft.com/office/powerpoint/2010/main" xmlns:p15="http://schemas.microsoft.com/office/powerpoint/2012/main" xmlns:ahyp="http://schemas.microsoft.com/office/drawing/2018/hyperlinkcolor" xmlns:go="http://customooxmlschemas.google.com/" r:id="rId16" roundtripDataSignature="AMtx7mj/K9O75hokTQceftHcE7ALSv6skA=="/>
     </p:ext>
   </p:extLst>
 </p:presentation>
@@ -306,8 +309,8 @@
         </p:nvSpPr>
         <p:spPr>
           <a:xfrm>
-            <a:off x="1143225" y="685800"/>
-            <a:ext cx="4572225" cy="3429000"/>
+            <a:off x="1714500" y="685800"/>
+            <a:ext cx="3429000" cy="3429000"/>
           </a:xfrm>
           <a:custGeom>
             <a:avLst/>
@@ -923,8 +926,8 @@
         </p:nvSpPr>
         <p:spPr>
           <a:xfrm>
-            <a:off x="1143000" y="685800"/>
-            <a:ext cx="4572000" cy="3429000"/>
+            <a:off x="1714500" y="685800"/>
+            <a:ext cx="3429000" cy="3429000"/>
           </a:xfrm>
           <a:custGeom>
             <a:avLst/>
@@ -1003,7 +1006,7 @@
         </p:nvCxnSpPr>
         <p:spPr>
           <a:xfrm>
-            <a:off x="11893077" y="2660160"/>
+            <a:off x="11893079" y="3546880"/>
             <a:ext cx="29972100" cy="0"/>
           </a:xfrm>
           <a:prstGeom prst="straightConnector1">
@@ -1029,7 +1032,7 @@
         </p:nvCxnSpPr>
         <p:spPr>
           <a:xfrm>
-            <a:off x="11893077" y="30336000"/>
+            <a:off x="11893079" y="40448000"/>
             <a:ext cx="29972100" cy="0"/>
           </a:xfrm>
           <a:prstGeom prst="straightConnector1">
@@ -1055,7 +1058,7 @@
         </p:nvCxnSpPr>
         <p:spPr>
           <a:xfrm>
-            <a:off x="2040951" y="2660160"/>
+            <a:off x="2040951" y="3546880"/>
             <a:ext cx="879900" cy="0"/>
           </a:xfrm>
           <a:prstGeom prst="straightConnector1">
@@ -1085,8 +1088,8 @@
         </p:nvSpPr>
         <p:spPr>
           <a:xfrm>
-            <a:off x="11384280" y="4033440"/>
-            <a:ext cx="30391200" cy="9868800"/>
+            <a:off x="11384280" y="5377920"/>
+            <a:ext cx="30391200" cy="13158400"/>
           </a:xfrm>
           <a:prstGeom prst="rect">
             <a:avLst/>
@@ -1109,7 +1112,7 @@
               </a:buClr>
               <a:buSzPts val="25600"/>
               <a:buNone/>
-              <a:defRPr sz="25600">
+              <a:defRPr sz="25598">
                 <a:solidFill>
                   <a:schemeClr val="lt1"/>
                 </a:solidFill>
@@ -1127,7 +1130,7 @@
               </a:buClr>
               <a:buSzPts val="25600"/>
               <a:buNone/>
-              <a:defRPr sz="25600">
+              <a:defRPr sz="25598">
                 <a:solidFill>
                   <a:schemeClr val="lt1"/>
                 </a:solidFill>
@@ -1145,7 +1148,7 @@
               </a:buClr>
               <a:buSzPts val="25600"/>
               <a:buNone/>
-              <a:defRPr sz="25600">
+              <a:defRPr sz="25598">
                 <a:solidFill>
                   <a:schemeClr val="lt1"/>
                 </a:solidFill>
@@ -1163,7 +1166,7 @@
               </a:buClr>
               <a:buSzPts val="25600"/>
               <a:buNone/>
-              <a:defRPr sz="25600">
+              <a:defRPr sz="25598">
                 <a:solidFill>
                   <a:schemeClr val="lt1"/>
                 </a:solidFill>
@@ -1181,7 +1184,7 @@
               </a:buClr>
               <a:buSzPts val="25600"/>
               <a:buNone/>
-              <a:defRPr sz="25600">
+              <a:defRPr sz="25598">
                 <a:solidFill>
                   <a:schemeClr val="lt1"/>
                 </a:solidFill>
@@ -1199,7 +1202,7 @@
               </a:buClr>
               <a:buSzPts val="25600"/>
               <a:buNone/>
-              <a:defRPr sz="25600">
+              <a:defRPr sz="25598">
                 <a:solidFill>
                   <a:schemeClr val="lt1"/>
                 </a:solidFill>
@@ -1217,7 +1220,7 @@
               </a:buClr>
               <a:buSzPts val="25600"/>
               <a:buNone/>
-              <a:defRPr sz="25600">
+              <a:defRPr sz="25598">
                 <a:solidFill>
                   <a:schemeClr val="lt1"/>
                 </a:solidFill>
@@ -1235,7 +1238,7 @@
               </a:buClr>
               <a:buSzPts val="25600"/>
               <a:buNone/>
-              <a:defRPr sz="25600">
+              <a:defRPr sz="25598">
                 <a:solidFill>
                   <a:schemeClr val="lt1"/>
                 </a:solidFill>
@@ -1253,7 +1256,7 @@
               </a:buClr>
               <a:buSzPts val="25600"/>
               <a:buNone/>
-              <a:defRPr sz="25600">
+              <a:defRPr sz="25598">
                 <a:solidFill>
                   <a:schemeClr val="lt1"/>
                 </a:solidFill>
@@ -1277,8 +1280,8 @@
         </p:nvSpPr>
         <p:spPr>
           <a:xfrm>
-            <a:off x="11473281" y="20726080"/>
-            <a:ext cx="30391200" cy="7947000"/>
+            <a:off x="11473281" y="27634773"/>
+            <a:ext cx="30391200" cy="10596000"/>
           </a:xfrm>
           <a:prstGeom prst="rect">
             <a:avLst/>
@@ -1496,8 +1499,8 @@
         </p:nvSpPr>
         <p:spPr>
           <a:xfrm>
-            <a:off x="40790396" y="30008058"/>
-            <a:ext cx="2633700" cy="2519100"/>
+            <a:off x="40790398" y="40010744"/>
+            <a:ext cx="2633700" cy="3358800"/>
           </a:xfrm>
           <a:prstGeom prst="rect">
             <a:avLst/>
@@ -1582,20 +1585,12 @@
             </a:lvl9pPr>
           </a:lstStyle>
           <a:p>
-            <a:pPr marL="0" lvl="0" indent="0" algn="r" rtl="0">
-              <a:spcBef>
-                <a:spcPts val="0"/>
-              </a:spcBef>
-              <a:spcAft>
-                <a:spcPts val="0"/>
-              </a:spcAft>
-              <a:buNone/>
-            </a:pPr>
             <a:fld id="{00000000-1234-1234-1234-123412341234}" type="slidenum">
-              <a:rPr lang="en-US"/>
+              <a:rPr lang="en-US" smtClean="0"/>
+              <a:pPr/>
               <a:t>‹#›</a:t>
             </a:fld>
-            <a:endParaRPr/>
+            <a:endParaRPr lang="en-US"/>
           </a:p>
         </p:txBody>
       </p:sp>
@@ -1632,7 +1627,7 @@
         </p:nvCxnSpPr>
         <p:spPr>
           <a:xfrm>
-            <a:off x="2040961" y="30336000"/>
+            <a:off x="2040962" y="40448000"/>
             <a:ext cx="39824700" cy="0"/>
           </a:xfrm>
           <a:prstGeom prst="straightConnector1">
@@ -1658,7 +1653,7 @@
         </p:nvCxnSpPr>
         <p:spPr>
           <a:xfrm>
-            <a:off x="2040961" y="2660160"/>
+            <a:off x="2040962" y="3546880"/>
             <a:ext cx="39824700" cy="0"/>
           </a:xfrm>
           <a:prstGeom prst="straightConnector1">
@@ -1688,8 +1683,8 @@
         </p:nvSpPr>
         <p:spPr>
           <a:xfrm>
-            <a:off x="4098960" y="8351040"/>
-            <a:ext cx="35693400" cy="9845700"/>
+            <a:off x="4098960" y="11134720"/>
+            <a:ext cx="35693400" cy="13127600"/>
           </a:xfrm>
           <a:prstGeom prst="rect">
             <a:avLst/>
@@ -1713,7 +1708,7 @@
               <a:buSzPts val="51200"/>
               <a:buFont typeface="Lato"/>
               <a:buNone/>
-              <a:defRPr sz="51200">
+              <a:defRPr sz="51198">
                 <a:solidFill>
                   <a:schemeClr val="dk1"/>
                 </a:solidFill>
@@ -1736,7 +1731,7 @@
               <a:buSzPts val="51200"/>
               <a:buFont typeface="Lato"/>
               <a:buNone/>
-              <a:defRPr sz="51200">
+              <a:defRPr sz="51198">
                 <a:solidFill>
                   <a:schemeClr val="dk1"/>
                 </a:solidFill>
@@ -1759,7 +1754,7 @@
               <a:buSzPts val="51200"/>
               <a:buFont typeface="Lato"/>
               <a:buNone/>
-              <a:defRPr sz="51200">
+              <a:defRPr sz="51198">
                 <a:solidFill>
                   <a:schemeClr val="dk1"/>
                 </a:solidFill>
@@ -1782,7 +1777,7 @@
               <a:buSzPts val="51200"/>
               <a:buFont typeface="Lato"/>
               <a:buNone/>
-              <a:defRPr sz="51200">
+              <a:defRPr sz="51198">
                 <a:solidFill>
                   <a:schemeClr val="dk1"/>
                 </a:solidFill>
@@ -1805,7 +1800,7 @@
               <a:buSzPts val="51200"/>
               <a:buFont typeface="Lato"/>
               <a:buNone/>
-              <a:defRPr sz="51200">
+              <a:defRPr sz="51198">
                 <a:solidFill>
                   <a:schemeClr val="dk1"/>
                 </a:solidFill>
@@ -1828,7 +1823,7 @@
               <a:buSzPts val="51200"/>
               <a:buFont typeface="Lato"/>
               <a:buNone/>
-              <a:defRPr sz="51200">
+              <a:defRPr sz="51198">
                 <a:solidFill>
                   <a:schemeClr val="dk1"/>
                 </a:solidFill>
@@ -1851,7 +1846,7 @@
               <a:buSzPts val="51200"/>
               <a:buFont typeface="Lato"/>
               <a:buNone/>
-              <a:defRPr sz="51200">
+              <a:defRPr sz="51198">
                 <a:solidFill>
                   <a:schemeClr val="dk1"/>
                 </a:solidFill>
@@ -1874,7 +1869,7 @@
               <a:buSzPts val="51200"/>
               <a:buFont typeface="Lato"/>
               <a:buNone/>
-              <a:defRPr sz="51200">
+              <a:defRPr sz="51198">
                 <a:solidFill>
                   <a:schemeClr val="dk1"/>
                 </a:solidFill>
@@ -1897,7 +1892,7 @@
               <a:buSzPts val="51200"/>
               <a:buFont typeface="Lato"/>
               <a:buNone/>
-              <a:defRPr sz="51200">
+              <a:defRPr sz="51198">
                 <a:solidFill>
                   <a:schemeClr val="dk1"/>
                 </a:solidFill>
@@ -1927,8 +1922,8 @@
         </p:nvSpPr>
         <p:spPr>
           <a:xfrm>
-            <a:off x="4098960" y="18684480"/>
-            <a:ext cx="35693400" cy="6858300"/>
+            <a:off x="4098960" y="24912640"/>
+            <a:ext cx="35693400" cy="9144400"/>
           </a:xfrm>
           <a:prstGeom prst="rect">
             <a:avLst/>
@@ -1939,7 +1934,7 @@
             <a:normAutofit/>
           </a:bodyPr>
           <a:lstStyle>
-            <a:lvl1pPr marL="457200" lvl="0" indent="-838200" algn="ctr" rtl="0">
+            <a:lvl1pPr marL="457178" lvl="0" indent="-838158" algn="ctr" rtl="0">
               <a:spcBef>
                 <a:spcPts val="0"/>
               </a:spcBef>
@@ -1950,7 +1945,7 @@
               <a:buChar char="●"/>
               <a:defRPr/>
             </a:lvl1pPr>
-            <a:lvl2pPr marL="914400" lvl="1" indent="-704850" algn="ctr" rtl="0">
+            <a:lvl2pPr marL="914354" lvl="1" indent="-704816" algn="ctr" rtl="0">
               <a:spcBef>
                 <a:spcPts val="0"/>
               </a:spcBef>
@@ -1961,7 +1956,7 @@
               <a:buChar char="○"/>
               <a:defRPr/>
             </a:lvl2pPr>
-            <a:lvl3pPr marL="1371600" lvl="2" indent="-704850" algn="ctr" rtl="0">
+            <a:lvl3pPr marL="1371532" lvl="2" indent="-704816" algn="ctr" rtl="0">
               <a:spcBef>
                 <a:spcPts val="0"/>
               </a:spcBef>
@@ -1972,7 +1967,7 @@
               <a:buChar char="■"/>
               <a:defRPr/>
             </a:lvl3pPr>
-            <a:lvl4pPr marL="1828800" lvl="3" indent="-704850" algn="ctr" rtl="0">
+            <a:lvl4pPr marL="1828709" lvl="3" indent="-704816" algn="ctr" rtl="0">
               <a:spcBef>
                 <a:spcPts val="0"/>
               </a:spcBef>
@@ -1983,7 +1978,7 @@
               <a:buChar char="●"/>
               <a:defRPr/>
             </a:lvl4pPr>
-            <a:lvl5pPr marL="2286000" lvl="4" indent="-704850" algn="ctr" rtl="0">
+            <a:lvl5pPr marL="2285886" lvl="4" indent="-704816" algn="ctr" rtl="0">
               <a:spcBef>
                 <a:spcPts val="0"/>
               </a:spcBef>
@@ -1994,7 +1989,7 @@
               <a:buChar char="○"/>
               <a:defRPr/>
             </a:lvl5pPr>
-            <a:lvl6pPr marL="2743200" lvl="5" indent="-704850" algn="ctr" rtl="0">
+            <a:lvl6pPr marL="2743064" lvl="5" indent="-704816" algn="ctr" rtl="0">
               <a:spcBef>
                 <a:spcPts val="0"/>
               </a:spcBef>
@@ -2005,7 +2000,7 @@
               <a:buChar char="■"/>
               <a:defRPr/>
             </a:lvl6pPr>
-            <a:lvl7pPr marL="3200400" lvl="6" indent="-704850" algn="ctr" rtl="0">
+            <a:lvl7pPr marL="3200240" lvl="6" indent="-704816" algn="ctr" rtl="0">
               <a:spcBef>
                 <a:spcPts val="0"/>
               </a:spcBef>
@@ -2016,7 +2011,7 @@
               <a:buChar char="●"/>
               <a:defRPr/>
             </a:lvl7pPr>
-            <a:lvl8pPr marL="3657600" lvl="7" indent="-704850" algn="ctr" rtl="0">
+            <a:lvl8pPr marL="3657417" lvl="7" indent="-704816" algn="ctr" rtl="0">
               <a:spcBef>
                 <a:spcPts val="0"/>
               </a:spcBef>
@@ -2027,7 +2022,7 @@
               <a:buChar char="○"/>
               <a:defRPr/>
             </a:lvl8pPr>
-            <a:lvl9pPr marL="4114800" lvl="8" indent="-704850" algn="ctr" rtl="0">
+            <a:lvl9pPr marL="4114595" lvl="8" indent="-704816" algn="ctr" rtl="0">
               <a:spcBef>
                 <a:spcPts val="0"/>
               </a:spcBef>
@@ -2056,8 +2051,8 @@
         </p:nvSpPr>
         <p:spPr>
           <a:xfrm>
-            <a:off x="40790396" y="30008058"/>
-            <a:ext cx="2633700" cy="2519100"/>
+            <a:off x="40790398" y="40010744"/>
+            <a:ext cx="2633700" cy="3358800"/>
           </a:xfrm>
           <a:prstGeom prst="rect">
             <a:avLst/>
@@ -2106,20 +2101,12 @@
             </a:lvl9pPr>
           </a:lstStyle>
           <a:p>
-            <a:pPr marL="0" lvl="0" indent="0" algn="r" rtl="0">
-              <a:spcBef>
-                <a:spcPts val="0"/>
-              </a:spcBef>
-              <a:spcAft>
-                <a:spcPts val="0"/>
-              </a:spcAft>
-              <a:buNone/>
-            </a:pPr>
             <a:fld id="{00000000-1234-1234-1234-123412341234}" type="slidenum">
-              <a:rPr lang="en-US"/>
+              <a:rPr lang="en-US" smtClean="0"/>
+              <a:pPr/>
               <a:t>‹#›</a:t>
             </a:fld>
-            <a:endParaRPr/>
+            <a:endParaRPr lang="en-US"/>
           </a:p>
         </p:txBody>
       </p:sp>
@@ -2160,8 +2147,8 @@
         </p:nvSpPr>
         <p:spPr>
           <a:xfrm>
-            <a:off x="40790396" y="30008058"/>
-            <a:ext cx="2633700" cy="2519100"/>
+            <a:off x="40790398" y="40010744"/>
+            <a:ext cx="2633700" cy="3358800"/>
           </a:xfrm>
           <a:prstGeom prst="rect">
             <a:avLst/>
@@ -2210,20 +2197,12 @@
             </a:lvl9pPr>
           </a:lstStyle>
           <a:p>
-            <a:pPr marL="0" lvl="0" indent="0" algn="r" rtl="0">
-              <a:spcBef>
-                <a:spcPts val="0"/>
-              </a:spcBef>
-              <a:spcAft>
-                <a:spcPts val="0"/>
-              </a:spcAft>
-              <a:buNone/>
-            </a:pPr>
             <a:fld id="{00000000-1234-1234-1234-123412341234}" type="slidenum">
-              <a:rPr lang="en-US"/>
+              <a:rPr lang="en-US" smtClean="0"/>
+              <a:pPr/>
               <a:t>‹#›</a:t>
             </a:fld>
-            <a:endParaRPr/>
+            <a:endParaRPr lang="en-US"/>
           </a:p>
         </p:txBody>
       </p:sp>
@@ -2267,8 +2246,8 @@
         </p:blipFill>
         <p:spPr>
           <a:xfrm>
-            <a:off x="6035227" y="7"/>
-            <a:ext cx="37855973" cy="32918395"/>
+            <a:off x="6035229" y="13"/>
+            <a:ext cx="37855973" cy="43891193"/>
           </a:xfrm>
           <a:prstGeom prst="rect">
             <a:avLst/>
@@ -2287,8 +2266,8 @@
         </p:nvSpPr>
         <p:spPr>
           <a:xfrm rot="-5400000">
-            <a:off x="-10588014" y="16261659"/>
-            <a:ext cx="32918400" cy="395100"/>
+            <a:off x="-16074415" y="21748062"/>
+            <a:ext cx="43891200" cy="395100"/>
           </a:xfrm>
           <a:prstGeom prst="rect">
             <a:avLst/>
@@ -2354,8 +2333,8 @@
         </p:nvGrpSpPr>
         <p:grpSpPr>
           <a:xfrm flipH="1">
-            <a:off x="41218295" y="992248"/>
-            <a:ext cx="1881297" cy="2545807"/>
+            <a:off x="41218299" y="1323001"/>
+            <a:ext cx="1881297" cy="3394409"/>
             <a:chOff x="2645664" y="2011680"/>
             <a:chExt cx="735600" cy="746571"/>
           </a:xfrm>
@@ -2516,8 +2495,8 @@
         </p:blipFill>
         <p:spPr>
           <a:xfrm>
-            <a:off x="1097308" y="29227770"/>
-            <a:ext cx="3641449" cy="3126894"/>
+            <a:off x="1097311" y="38970360"/>
+            <a:ext cx="3641449" cy="4169192"/>
           </a:xfrm>
           <a:prstGeom prst="rect">
             <a:avLst/>
@@ -2536,8 +2515,8 @@
         </p:nvSpPr>
         <p:spPr>
           <a:xfrm>
-            <a:off x="28889373" y="31366048"/>
-            <a:ext cx="14007600" cy="708000"/>
+            <a:off x="28889373" y="41821400"/>
+            <a:ext cx="14007600" cy="707846"/>
           </a:xfrm>
           <a:prstGeom prst="rect">
             <a:avLst/>
@@ -2635,7 +2614,7 @@
         </p:nvCxnSpPr>
         <p:spPr>
           <a:xfrm>
-            <a:off x="2040961" y="2660160"/>
+            <a:off x="2040962" y="3546880"/>
             <a:ext cx="39824700" cy="0"/>
           </a:xfrm>
           <a:prstGeom prst="straightConnector1">
@@ -2661,7 +2640,7 @@
         </p:nvCxnSpPr>
         <p:spPr>
           <a:xfrm>
-            <a:off x="2040961" y="30336000"/>
+            <a:off x="2040962" y="40448000"/>
             <a:ext cx="39824700" cy="0"/>
           </a:xfrm>
           <a:prstGeom prst="straightConnector1">
@@ -2691,8 +2670,8 @@
         </p:nvSpPr>
         <p:spPr>
           <a:xfrm>
-            <a:off x="1950840" y="11563680"/>
-            <a:ext cx="39824700" cy="9868800"/>
+            <a:off x="1950842" y="15418240"/>
+            <a:ext cx="39824700" cy="13158400"/>
           </a:xfrm>
           <a:prstGeom prst="rect">
             <a:avLst/>
@@ -2715,7 +2694,7 @@
               </a:buClr>
               <a:buSzPts val="25600"/>
               <a:buNone/>
-              <a:defRPr sz="25600">
+              <a:defRPr sz="25598">
                 <a:solidFill>
                   <a:schemeClr val="lt1"/>
                 </a:solidFill>
@@ -2733,7 +2712,7 @@
               </a:buClr>
               <a:buSzPts val="25600"/>
               <a:buNone/>
-              <a:defRPr sz="25600">
+              <a:defRPr sz="25598">
                 <a:solidFill>
                   <a:schemeClr val="lt1"/>
                 </a:solidFill>
@@ -2751,7 +2730,7 @@
               </a:buClr>
               <a:buSzPts val="25600"/>
               <a:buNone/>
-              <a:defRPr sz="25600">
+              <a:defRPr sz="25598">
                 <a:solidFill>
                   <a:schemeClr val="lt1"/>
                 </a:solidFill>
@@ -2769,7 +2748,7 @@
               </a:buClr>
               <a:buSzPts val="25600"/>
               <a:buNone/>
-              <a:defRPr sz="25600">
+              <a:defRPr sz="25598">
                 <a:solidFill>
                   <a:schemeClr val="lt1"/>
                 </a:solidFill>
@@ -2787,7 +2766,7 @@
               </a:buClr>
               <a:buSzPts val="25600"/>
               <a:buNone/>
-              <a:defRPr sz="25600">
+              <a:defRPr sz="25598">
                 <a:solidFill>
                   <a:schemeClr val="lt1"/>
                 </a:solidFill>
@@ -2805,7 +2784,7 @@
               </a:buClr>
               <a:buSzPts val="25600"/>
               <a:buNone/>
-              <a:defRPr sz="25600">
+              <a:defRPr sz="25598">
                 <a:solidFill>
                   <a:schemeClr val="lt1"/>
                 </a:solidFill>
@@ -2823,7 +2802,7 @@
               </a:buClr>
               <a:buSzPts val="25600"/>
               <a:buNone/>
-              <a:defRPr sz="25600">
+              <a:defRPr sz="25598">
                 <a:solidFill>
                   <a:schemeClr val="lt1"/>
                 </a:solidFill>
@@ -2841,7 +2820,7 @@
               </a:buClr>
               <a:buSzPts val="25600"/>
               <a:buNone/>
-              <a:defRPr sz="25600">
+              <a:defRPr sz="25598">
                 <a:solidFill>
                   <a:schemeClr val="lt1"/>
                 </a:solidFill>
@@ -2859,7 +2838,7 @@
               </a:buClr>
               <a:buSzPts val="25600"/>
               <a:buNone/>
-              <a:defRPr sz="25600">
+              <a:defRPr sz="25598">
                 <a:solidFill>
                   <a:schemeClr val="lt1"/>
                 </a:solidFill>
@@ -2883,8 +2862,8 @@
         </p:nvSpPr>
         <p:spPr>
           <a:xfrm>
-            <a:off x="40790396" y="30008058"/>
-            <a:ext cx="2633700" cy="2519100"/>
+            <a:off x="40790398" y="40010744"/>
+            <a:ext cx="2633700" cy="3358800"/>
           </a:xfrm>
           <a:prstGeom prst="rect">
             <a:avLst/>
@@ -2969,20 +2948,12 @@
             </a:lvl9pPr>
           </a:lstStyle>
           <a:p>
-            <a:pPr marL="0" lvl="0" indent="0" algn="r" rtl="0">
-              <a:spcBef>
-                <a:spcPts val="0"/>
-              </a:spcBef>
-              <a:spcAft>
-                <a:spcPts val="0"/>
-              </a:spcAft>
-              <a:buNone/>
-            </a:pPr>
             <a:fld id="{00000000-1234-1234-1234-123412341234}" type="slidenum">
-              <a:rPr lang="en-US"/>
+              <a:rPr lang="en-US" smtClean="0"/>
+              <a:pPr/>
               <a:t>‹#›</a:t>
             </a:fld>
-            <a:endParaRPr/>
+            <a:endParaRPr lang="en-US"/>
           </a:p>
         </p:txBody>
       </p:sp>
@@ -3019,7 +2990,7 @@
         </p:nvCxnSpPr>
         <p:spPr>
           <a:xfrm>
-            <a:off x="11893077" y="2660160"/>
+            <a:off x="11893079" y="3546880"/>
             <a:ext cx="29972100" cy="0"/>
           </a:xfrm>
           <a:prstGeom prst="straightConnector1">
@@ -3045,7 +3016,7 @@
         </p:nvCxnSpPr>
         <p:spPr>
           <a:xfrm>
-            <a:off x="11893077" y="30336000"/>
+            <a:off x="11893079" y="40448000"/>
             <a:ext cx="29972100" cy="0"/>
           </a:xfrm>
           <a:prstGeom prst="straightConnector1">
@@ -3071,7 +3042,7 @@
         </p:nvCxnSpPr>
         <p:spPr>
           <a:xfrm>
-            <a:off x="2040951" y="2660160"/>
+            <a:off x="2040951" y="3546880"/>
             <a:ext cx="879900" cy="0"/>
           </a:xfrm>
           <a:prstGeom prst="straightConnector1">
@@ -3101,8 +3072,8 @@
         </p:nvSpPr>
         <p:spPr>
           <a:xfrm>
-            <a:off x="11521200" y="3686080"/>
-            <a:ext cx="30343800" cy="4066500"/>
+            <a:off x="11521200" y="4914773"/>
+            <a:ext cx="30343800" cy="5422000"/>
           </a:xfrm>
           <a:prstGeom prst="rect">
             <a:avLst/>
@@ -3230,8 +3201,8 @@
         </p:nvSpPr>
         <p:spPr>
           <a:xfrm>
-            <a:off x="11568539" y="10212966"/>
-            <a:ext cx="30343800" cy="19215300"/>
+            <a:off x="11568539" y="13617288"/>
+            <a:ext cx="30343800" cy="25620400"/>
           </a:xfrm>
           <a:prstGeom prst="rect">
             <a:avLst/>
@@ -3242,7 +3213,7 @@
             <a:normAutofit/>
           </a:bodyPr>
           <a:lstStyle>
-            <a:lvl1pPr marL="457200" lvl="0" indent="-838200" rtl="0">
+            <a:lvl1pPr marL="457178" lvl="0" indent="-838158" rtl="0">
               <a:spcBef>
                 <a:spcPts val="0"/>
               </a:spcBef>
@@ -3253,7 +3224,7 @@
               <a:buChar char="●"/>
               <a:defRPr/>
             </a:lvl1pPr>
-            <a:lvl2pPr marL="914400" lvl="1" indent="-704850" rtl="0">
+            <a:lvl2pPr marL="914354" lvl="1" indent="-704816" rtl="0">
               <a:spcBef>
                 <a:spcPts val="0"/>
               </a:spcBef>
@@ -3264,7 +3235,7 @@
               <a:buChar char="○"/>
               <a:defRPr/>
             </a:lvl2pPr>
-            <a:lvl3pPr marL="1371600" lvl="2" indent="-704850" rtl="0">
+            <a:lvl3pPr marL="1371532" lvl="2" indent="-704816" rtl="0">
               <a:spcBef>
                 <a:spcPts val="0"/>
               </a:spcBef>
@@ -3275,7 +3246,7 @@
               <a:buChar char="■"/>
               <a:defRPr/>
             </a:lvl3pPr>
-            <a:lvl4pPr marL="1828800" lvl="3" indent="-704850" rtl="0">
+            <a:lvl4pPr marL="1828709" lvl="3" indent="-704816" rtl="0">
               <a:spcBef>
                 <a:spcPts val="0"/>
               </a:spcBef>
@@ -3286,7 +3257,7 @@
               <a:buChar char="●"/>
               <a:defRPr/>
             </a:lvl4pPr>
-            <a:lvl5pPr marL="2286000" lvl="4" indent="-704850" rtl="0">
+            <a:lvl5pPr marL="2285886" lvl="4" indent="-704816" rtl="0">
               <a:spcBef>
                 <a:spcPts val="0"/>
               </a:spcBef>
@@ -3297,7 +3268,7 @@
               <a:buChar char="○"/>
               <a:defRPr/>
             </a:lvl5pPr>
-            <a:lvl6pPr marL="2743200" lvl="5" indent="-704850" rtl="0">
+            <a:lvl6pPr marL="2743064" lvl="5" indent="-704816" rtl="0">
               <a:spcBef>
                 <a:spcPts val="0"/>
               </a:spcBef>
@@ -3308,7 +3279,7 @@
               <a:buChar char="■"/>
               <a:defRPr/>
             </a:lvl6pPr>
-            <a:lvl7pPr marL="3200400" lvl="6" indent="-704850" rtl="0">
+            <a:lvl7pPr marL="3200240" lvl="6" indent="-704816" rtl="0">
               <a:spcBef>
                 <a:spcPts val="0"/>
               </a:spcBef>
@@ -3319,7 +3290,7 @@
               <a:buChar char="●"/>
               <a:defRPr/>
             </a:lvl7pPr>
-            <a:lvl8pPr marL="3657600" lvl="7" indent="-704850" rtl="0">
+            <a:lvl8pPr marL="3657417" lvl="7" indent="-704816" rtl="0">
               <a:spcBef>
                 <a:spcPts val="0"/>
               </a:spcBef>
@@ -3330,7 +3301,7 @@
               <a:buChar char="○"/>
               <a:defRPr/>
             </a:lvl8pPr>
-            <a:lvl9pPr marL="4114800" lvl="8" indent="-704850" rtl="0">
+            <a:lvl9pPr marL="4114595" lvl="8" indent="-704816" rtl="0">
               <a:spcBef>
                 <a:spcPts val="0"/>
               </a:spcBef>
@@ -3359,8 +3330,8 @@
         </p:nvSpPr>
         <p:spPr>
           <a:xfrm>
-            <a:off x="40790396" y="30008058"/>
-            <a:ext cx="2633700" cy="2519100"/>
+            <a:off x="40790398" y="40010744"/>
+            <a:ext cx="2633700" cy="3358800"/>
           </a:xfrm>
           <a:prstGeom prst="rect">
             <a:avLst/>
@@ -3409,20 +3380,12 @@
             </a:lvl9pPr>
           </a:lstStyle>
           <a:p>
-            <a:pPr marL="0" lvl="0" indent="0" algn="r" rtl="0">
-              <a:spcBef>
-                <a:spcPts val="0"/>
-              </a:spcBef>
-              <a:spcAft>
-                <a:spcPts val="0"/>
-              </a:spcAft>
-              <a:buNone/>
-            </a:pPr>
             <a:fld id="{00000000-1234-1234-1234-123412341234}" type="slidenum">
-              <a:rPr lang="en-US"/>
+              <a:rPr lang="en-US" smtClean="0"/>
+              <a:pPr/>
               <a:t>‹#›</a:t>
             </a:fld>
-            <a:endParaRPr/>
+            <a:endParaRPr lang="en-US"/>
           </a:p>
         </p:txBody>
       </p:sp>
@@ -3459,7 +3422,7 @@
         </p:nvCxnSpPr>
         <p:spPr>
           <a:xfrm>
-            <a:off x="11893077" y="2660160"/>
+            <a:off x="11893079" y="3546880"/>
             <a:ext cx="29972100" cy="0"/>
           </a:xfrm>
           <a:prstGeom prst="straightConnector1">
@@ -3485,7 +3448,7 @@
         </p:nvCxnSpPr>
         <p:spPr>
           <a:xfrm>
-            <a:off x="11893077" y="30336000"/>
+            <a:off x="11893079" y="40448000"/>
             <a:ext cx="29972100" cy="0"/>
           </a:xfrm>
           <a:prstGeom prst="straightConnector1">
@@ -3511,7 +3474,7 @@
         </p:nvCxnSpPr>
         <p:spPr>
           <a:xfrm>
-            <a:off x="2040951" y="2660160"/>
+            <a:off x="2040951" y="3546880"/>
             <a:ext cx="879900" cy="0"/>
           </a:xfrm>
           <a:prstGeom prst="straightConnector1">
@@ -3541,8 +3504,8 @@
         </p:nvSpPr>
         <p:spPr>
           <a:xfrm>
-            <a:off x="11521200" y="3686080"/>
-            <a:ext cx="30343800" cy="4066500"/>
+            <a:off x="11521200" y="4914773"/>
+            <a:ext cx="30343800" cy="5422000"/>
           </a:xfrm>
           <a:prstGeom prst="rect">
             <a:avLst/>
@@ -3670,8 +3633,8 @@
         </p:nvSpPr>
         <p:spPr>
           <a:xfrm>
-            <a:off x="11521452" y="10257120"/>
-            <a:ext cx="14742600" cy="19215300"/>
+            <a:off x="11521452" y="13676160"/>
+            <a:ext cx="14742600" cy="25620400"/>
           </a:xfrm>
           <a:prstGeom prst="rect">
             <a:avLst/>
@@ -3682,7 +3645,7 @@
             <a:normAutofit/>
           </a:bodyPr>
           <a:lstStyle>
-            <a:lvl1pPr marL="457200" lvl="0" indent="-704850" rtl="0">
+            <a:lvl1pPr marL="457178" lvl="0" indent="-704816" rtl="0">
               <a:spcBef>
                 <a:spcPts val="0"/>
               </a:spcBef>
@@ -3693,7 +3656,7 @@
               <a:buChar char="●"/>
               <a:defRPr sz="7500"/>
             </a:lvl1pPr>
-            <a:lvl2pPr marL="914400" lvl="1" indent="-635000" rtl="0">
+            <a:lvl2pPr marL="914354" lvl="1" indent="-634969" rtl="0">
               <a:spcBef>
                 <a:spcPts val="0"/>
               </a:spcBef>
@@ -3704,7 +3667,7 @@
               <a:buChar char="○"/>
               <a:defRPr sz="6400"/>
             </a:lvl2pPr>
-            <a:lvl3pPr marL="1371600" lvl="2" indent="-635000" rtl="0">
+            <a:lvl3pPr marL="1371532" lvl="2" indent="-634969" rtl="0">
               <a:spcBef>
                 <a:spcPts val="0"/>
               </a:spcBef>
@@ -3715,7 +3678,7 @@
               <a:buChar char="■"/>
               <a:defRPr sz="6400"/>
             </a:lvl3pPr>
-            <a:lvl4pPr marL="1828800" lvl="3" indent="-635000" rtl="0">
+            <a:lvl4pPr marL="1828709" lvl="3" indent="-634969" rtl="0">
               <a:spcBef>
                 <a:spcPts val="0"/>
               </a:spcBef>
@@ -3726,7 +3689,7 @@
               <a:buChar char="●"/>
               <a:defRPr sz="6400"/>
             </a:lvl4pPr>
-            <a:lvl5pPr marL="2286000" lvl="4" indent="-635000" rtl="0">
+            <a:lvl5pPr marL="2285886" lvl="4" indent="-634969" rtl="0">
               <a:spcBef>
                 <a:spcPts val="0"/>
               </a:spcBef>
@@ -3737,7 +3700,7 @@
               <a:buChar char="○"/>
               <a:defRPr sz="6400"/>
             </a:lvl5pPr>
-            <a:lvl6pPr marL="2743200" lvl="5" indent="-635000" rtl="0">
+            <a:lvl6pPr marL="2743064" lvl="5" indent="-634969" rtl="0">
               <a:spcBef>
                 <a:spcPts val="0"/>
               </a:spcBef>
@@ -3748,7 +3711,7 @@
               <a:buChar char="■"/>
               <a:defRPr sz="6400"/>
             </a:lvl6pPr>
-            <a:lvl7pPr marL="3200400" lvl="6" indent="-635000" rtl="0">
+            <a:lvl7pPr marL="3200240" lvl="6" indent="-634969" rtl="0">
               <a:spcBef>
                 <a:spcPts val="0"/>
               </a:spcBef>
@@ -3759,7 +3722,7 @@
               <a:buChar char="●"/>
               <a:defRPr sz="6400"/>
             </a:lvl7pPr>
-            <a:lvl8pPr marL="3657600" lvl="7" indent="-635000" rtl="0">
+            <a:lvl8pPr marL="3657417" lvl="7" indent="-634969" rtl="0">
               <a:spcBef>
                 <a:spcPts val="0"/>
               </a:spcBef>
@@ -3770,7 +3733,7 @@
               <a:buChar char="○"/>
               <a:defRPr sz="6400"/>
             </a:lvl8pPr>
-            <a:lvl9pPr marL="4114800" lvl="8" indent="-635000" rtl="0">
+            <a:lvl9pPr marL="4114595" lvl="8" indent="-634969" rtl="0">
               <a:spcBef>
                 <a:spcPts val="0"/>
               </a:spcBef>
@@ -3799,8 +3762,8 @@
         </p:nvSpPr>
         <p:spPr>
           <a:xfrm>
-            <a:off x="27122745" y="10257120"/>
-            <a:ext cx="14742600" cy="19215300"/>
+            <a:off x="27122745" y="13676160"/>
+            <a:ext cx="14742600" cy="25620400"/>
           </a:xfrm>
           <a:prstGeom prst="rect">
             <a:avLst/>
@@ -3811,7 +3774,7 @@
             <a:normAutofit/>
           </a:bodyPr>
           <a:lstStyle>
-            <a:lvl1pPr marL="457200" lvl="0" indent="-704850" rtl="0">
+            <a:lvl1pPr marL="457178" lvl="0" indent="-704816" rtl="0">
               <a:spcBef>
                 <a:spcPts val="0"/>
               </a:spcBef>
@@ -3822,7 +3785,7 @@
               <a:buChar char="●"/>
               <a:defRPr sz="7500"/>
             </a:lvl1pPr>
-            <a:lvl2pPr marL="914400" lvl="1" indent="-635000" rtl="0">
+            <a:lvl2pPr marL="914354" lvl="1" indent="-634969" rtl="0">
               <a:spcBef>
                 <a:spcPts val="0"/>
               </a:spcBef>
@@ -3833,7 +3796,7 @@
               <a:buChar char="○"/>
               <a:defRPr sz="6400"/>
             </a:lvl2pPr>
-            <a:lvl3pPr marL="1371600" lvl="2" indent="-635000" rtl="0">
+            <a:lvl3pPr marL="1371532" lvl="2" indent="-634969" rtl="0">
               <a:spcBef>
                 <a:spcPts val="0"/>
               </a:spcBef>
@@ -3844,7 +3807,7 @@
               <a:buChar char="■"/>
               <a:defRPr sz="6400"/>
             </a:lvl3pPr>
-            <a:lvl4pPr marL="1828800" lvl="3" indent="-635000" rtl="0">
+            <a:lvl4pPr marL="1828709" lvl="3" indent="-634969" rtl="0">
               <a:spcBef>
                 <a:spcPts val="0"/>
               </a:spcBef>
@@ -3855,7 +3818,7 @@
               <a:buChar char="●"/>
               <a:defRPr sz="6400"/>
             </a:lvl4pPr>
-            <a:lvl5pPr marL="2286000" lvl="4" indent="-635000" rtl="0">
+            <a:lvl5pPr marL="2285886" lvl="4" indent="-634969" rtl="0">
               <a:spcBef>
                 <a:spcPts val="0"/>
               </a:spcBef>
@@ -3866,7 +3829,7 @@
               <a:buChar char="○"/>
               <a:defRPr sz="6400"/>
             </a:lvl5pPr>
-            <a:lvl6pPr marL="2743200" lvl="5" indent="-635000" rtl="0">
+            <a:lvl6pPr marL="2743064" lvl="5" indent="-634969" rtl="0">
               <a:spcBef>
                 <a:spcPts val="0"/>
               </a:spcBef>
@@ -3877,7 +3840,7 @@
               <a:buChar char="■"/>
               <a:defRPr sz="6400"/>
             </a:lvl6pPr>
-            <a:lvl7pPr marL="3200400" lvl="6" indent="-635000" rtl="0">
+            <a:lvl7pPr marL="3200240" lvl="6" indent="-634969" rtl="0">
               <a:spcBef>
                 <a:spcPts val="0"/>
               </a:spcBef>
@@ -3888,7 +3851,7 @@
               <a:buChar char="●"/>
               <a:defRPr sz="6400"/>
             </a:lvl7pPr>
-            <a:lvl8pPr marL="3657600" lvl="7" indent="-635000" rtl="0">
+            <a:lvl8pPr marL="3657417" lvl="7" indent="-634969" rtl="0">
               <a:spcBef>
                 <a:spcPts val="0"/>
               </a:spcBef>
@@ -3899,7 +3862,7 @@
               <a:buChar char="○"/>
               <a:defRPr sz="6400"/>
             </a:lvl8pPr>
-            <a:lvl9pPr marL="4114800" lvl="8" indent="-635000" rtl="0">
+            <a:lvl9pPr marL="4114595" lvl="8" indent="-634969" rtl="0">
               <a:spcBef>
                 <a:spcPts val="0"/>
               </a:spcBef>
@@ -3928,8 +3891,8 @@
         </p:nvSpPr>
         <p:spPr>
           <a:xfrm>
-            <a:off x="40790396" y="30008058"/>
-            <a:ext cx="2633700" cy="2519100"/>
+            <a:off x="40790398" y="40010744"/>
+            <a:ext cx="2633700" cy="3358800"/>
           </a:xfrm>
           <a:prstGeom prst="rect">
             <a:avLst/>
@@ -3978,20 +3941,12 @@
             </a:lvl9pPr>
           </a:lstStyle>
           <a:p>
-            <a:pPr marL="0" lvl="0" indent="0" algn="r" rtl="0">
-              <a:spcBef>
-                <a:spcPts val="0"/>
-              </a:spcBef>
-              <a:spcAft>
-                <a:spcPts val="0"/>
-              </a:spcAft>
-              <a:buNone/>
-            </a:pPr>
             <a:fld id="{00000000-1234-1234-1234-123412341234}" type="slidenum">
-              <a:rPr lang="en-US"/>
+              <a:rPr lang="en-US" smtClean="0"/>
+              <a:pPr/>
               <a:t>‹#›</a:t>
             </a:fld>
-            <a:endParaRPr/>
+            <a:endParaRPr lang="en-US"/>
           </a:p>
         </p:txBody>
       </p:sp>
@@ -4032,8 +3987,8 @@
         </p:nvSpPr>
         <p:spPr>
           <a:xfrm>
-            <a:off x="1455840" y="2634080"/>
-            <a:ext cx="40899000" cy="4093500"/>
+            <a:off x="1455840" y="3512107"/>
+            <a:ext cx="40899000" cy="5458000"/>
           </a:xfrm>
           <a:prstGeom prst="rect">
             <a:avLst/>
@@ -4161,8 +4116,8 @@
         </p:nvSpPr>
         <p:spPr>
           <a:xfrm>
-            <a:off x="40790396" y="30008058"/>
-            <a:ext cx="2633700" cy="2519100"/>
+            <a:off x="40790398" y="40010744"/>
+            <a:ext cx="2633700" cy="3358800"/>
           </a:xfrm>
           <a:prstGeom prst="rect">
             <a:avLst/>
@@ -4211,20 +4166,12 @@
             </a:lvl9pPr>
           </a:lstStyle>
           <a:p>
-            <a:pPr marL="0" lvl="0" indent="0" algn="r" rtl="0">
-              <a:spcBef>
-                <a:spcPts val="0"/>
-              </a:spcBef>
-              <a:spcAft>
-                <a:spcPts val="0"/>
-              </a:spcAft>
-              <a:buNone/>
-            </a:pPr>
             <a:fld id="{00000000-1234-1234-1234-123412341234}" type="slidenum">
-              <a:rPr lang="en-US"/>
+              <a:rPr lang="en-US" smtClean="0"/>
+              <a:pPr/>
               <a:t>‹#›</a:t>
             </a:fld>
-            <a:endParaRPr/>
+            <a:endParaRPr lang="en-US"/>
           </a:p>
         </p:txBody>
       </p:sp>
@@ -4261,7 +4208,7 @@
         </p:nvCxnSpPr>
         <p:spPr>
           <a:xfrm>
-            <a:off x="2040951" y="2660160"/>
+            <a:off x="2040951" y="3546880"/>
             <a:ext cx="879900" cy="0"/>
           </a:xfrm>
           <a:prstGeom prst="straightConnector1">
@@ -4291,8 +4238,8 @@
         </p:nvSpPr>
         <p:spPr>
           <a:xfrm>
-            <a:off x="1533600" y="5994240"/>
-            <a:ext cx="13478400" cy="4836600"/>
+            <a:off x="1533600" y="7992320"/>
+            <a:ext cx="13478400" cy="6448800"/>
           </a:xfrm>
           <a:prstGeom prst="rect">
             <a:avLst/>
@@ -4420,8 +4367,8 @@
         </p:nvSpPr>
         <p:spPr>
           <a:xfrm>
-            <a:off x="1533600" y="11819545"/>
-            <a:ext cx="13478400" cy="17959800"/>
+            <a:off x="1533600" y="15759393"/>
+            <a:ext cx="13478400" cy="23946400"/>
           </a:xfrm>
           <a:prstGeom prst="rect">
             <a:avLst/>
@@ -4432,7 +4379,7 @@
             <a:normAutofit/>
           </a:bodyPr>
           <a:lstStyle>
-            <a:lvl1pPr marL="457200" lvl="0" indent="-635000" rtl="0">
+            <a:lvl1pPr marL="457178" lvl="0" indent="-634969" rtl="0">
               <a:spcBef>
                 <a:spcPts val="0"/>
               </a:spcBef>
@@ -4443,7 +4390,7 @@
               <a:buChar char="●"/>
               <a:defRPr sz="6400"/>
             </a:lvl1pPr>
-            <a:lvl2pPr marL="914400" lvl="1" indent="-635000" rtl="0">
+            <a:lvl2pPr marL="914354" lvl="1" indent="-634969" rtl="0">
               <a:spcBef>
                 <a:spcPts val="0"/>
               </a:spcBef>
@@ -4454,7 +4401,7 @@
               <a:buChar char="○"/>
               <a:defRPr sz="6400"/>
             </a:lvl2pPr>
-            <a:lvl3pPr marL="1371600" lvl="2" indent="-635000" rtl="0">
+            <a:lvl3pPr marL="1371532" lvl="2" indent="-634969" rtl="0">
               <a:spcBef>
                 <a:spcPts val="0"/>
               </a:spcBef>
@@ -4465,7 +4412,7 @@
               <a:buChar char="■"/>
               <a:defRPr sz="6400"/>
             </a:lvl3pPr>
-            <a:lvl4pPr marL="1828800" lvl="3" indent="-635000" rtl="0">
+            <a:lvl4pPr marL="1828709" lvl="3" indent="-634969" rtl="0">
               <a:spcBef>
                 <a:spcPts val="0"/>
               </a:spcBef>
@@ -4476,7 +4423,7 @@
               <a:buChar char="●"/>
               <a:defRPr sz="6400"/>
             </a:lvl4pPr>
-            <a:lvl5pPr marL="2286000" lvl="4" indent="-635000" rtl="0">
+            <a:lvl5pPr marL="2285886" lvl="4" indent="-634969" rtl="0">
               <a:spcBef>
                 <a:spcPts val="0"/>
               </a:spcBef>
@@ -4487,7 +4434,7 @@
               <a:buChar char="○"/>
               <a:defRPr sz="6400"/>
             </a:lvl5pPr>
-            <a:lvl6pPr marL="2743200" lvl="5" indent="-635000" rtl="0">
+            <a:lvl6pPr marL="2743064" lvl="5" indent="-634969" rtl="0">
               <a:spcBef>
                 <a:spcPts val="0"/>
               </a:spcBef>
@@ -4498,7 +4445,7 @@
               <a:buChar char="■"/>
               <a:defRPr sz="6400"/>
             </a:lvl6pPr>
-            <a:lvl7pPr marL="3200400" lvl="6" indent="-635000" rtl="0">
+            <a:lvl7pPr marL="3200240" lvl="6" indent="-634969" rtl="0">
               <a:spcBef>
                 <a:spcPts val="0"/>
               </a:spcBef>
@@ -4509,7 +4456,7 @@
               <a:buChar char="●"/>
               <a:defRPr sz="6400"/>
             </a:lvl7pPr>
-            <a:lvl8pPr marL="3657600" lvl="7" indent="-635000" rtl="0">
+            <a:lvl8pPr marL="3657417" lvl="7" indent="-634969" rtl="0">
               <a:spcBef>
                 <a:spcPts val="0"/>
               </a:spcBef>
@@ -4520,7 +4467,7 @@
               <a:buChar char="○"/>
               <a:defRPr sz="6400"/>
             </a:lvl8pPr>
-            <a:lvl9pPr marL="4114800" lvl="8" indent="-635000" rtl="0">
+            <a:lvl9pPr marL="4114595" lvl="8" indent="-634969" rtl="0">
               <a:spcBef>
                 <a:spcPts val="0"/>
               </a:spcBef>
@@ -4549,8 +4496,8 @@
         </p:nvSpPr>
         <p:spPr>
           <a:xfrm>
-            <a:off x="40790396" y="30008058"/>
-            <a:ext cx="2633700" cy="2519100"/>
+            <a:off x="40790398" y="40010744"/>
+            <a:ext cx="2633700" cy="3358800"/>
           </a:xfrm>
           <a:prstGeom prst="rect">
             <a:avLst/>
@@ -4599,20 +4546,12 @@
             </a:lvl9pPr>
           </a:lstStyle>
           <a:p>
-            <a:pPr marL="0" lvl="0" indent="0" algn="r" rtl="0">
-              <a:spcBef>
-                <a:spcPts val="0"/>
-              </a:spcBef>
-              <a:spcAft>
-                <a:spcPts val="0"/>
-              </a:spcAft>
-              <a:buNone/>
-            </a:pPr>
             <a:fld id="{00000000-1234-1234-1234-123412341234}" type="slidenum">
-              <a:rPr lang="en-US"/>
+              <a:rPr lang="en-US" smtClean="0"/>
+              <a:pPr/>
               <a:t>‹#›</a:t>
             </a:fld>
-            <a:endParaRPr/>
+            <a:endParaRPr lang="en-US"/>
           </a:p>
         </p:txBody>
       </p:sp>
@@ -4657,7 +4596,7 @@
         </p:nvCxnSpPr>
         <p:spPr>
           <a:xfrm>
-            <a:off x="2040951" y="2660160"/>
+            <a:off x="2040951" y="3546880"/>
             <a:ext cx="879900" cy="0"/>
           </a:xfrm>
           <a:prstGeom prst="straightConnector1">
@@ -4687,8 +4626,8 @@
         </p:nvSpPr>
         <p:spPr>
           <a:xfrm>
-            <a:off x="1358895" y="4557700"/>
-            <a:ext cx="29972100" cy="24547200"/>
+            <a:off x="1358895" y="6076933"/>
+            <a:ext cx="29972100" cy="32729600"/>
           </a:xfrm>
           <a:prstGeom prst="rect">
             <a:avLst/>
@@ -4711,7 +4650,7 @@
               </a:buClr>
               <a:buSzPts val="25600"/>
               <a:buNone/>
-              <a:defRPr sz="25600">
+              <a:defRPr sz="25598">
                 <a:solidFill>
                   <a:schemeClr val="lt1"/>
                 </a:solidFill>
@@ -4729,7 +4668,7 @@
               </a:buClr>
               <a:buSzPts val="25600"/>
               <a:buNone/>
-              <a:defRPr sz="25600">
+              <a:defRPr sz="25598">
                 <a:solidFill>
                   <a:schemeClr val="lt1"/>
                 </a:solidFill>
@@ -4747,7 +4686,7 @@
               </a:buClr>
               <a:buSzPts val="25600"/>
               <a:buNone/>
-              <a:defRPr sz="25600">
+              <a:defRPr sz="25598">
                 <a:solidFill>
                   <a:schemeClr val="lt1"/>
                 </a:solidFill>
@@ -4765,7 +4704,7 @@
               </a:buClr>
               <a:buSzPts val="25600"/>
               <a:buNone/>
-              <a:defRPr sz="25600">
+              <a:defRPr sz="25598">
                 <a:solidFill>
                   <a:schemeClr val="lt1"/>
                 </a:solidFill>
@@ -4783,7 +4722,7 @@
               </a:buClr>
               <a:buSzPts val="25600"/>
               <a:buNone/>
-              <a:defRPr sz="25600">
+              <a:defRPr sz="25598">
                 <a:solidFill>
                   <a:schemeClr val="lt1"/>
                 </a:solidFill>
@@ -4801,7 +4740,7 @@
               </a:buClr>
               <a:buSzPts val="25600"/>
               <a:buNone/>
-              <a:defRPr sz="25600">
+              <a:defRPr sz="25598">
                 <a:solidFill>
                   <a:schemeClr val="lt1"/>
                 </a:solidFill>
@@ -4819,7 +4758,7 @@
               </a:buClr>
               <a:buSzPts val="25600"/>
               <a:buNone/>
-              <a:defRPr sz="25600">
+              <a:defRPr sz="25598">
                 <a:solidFill>
                   <a:schemeClr val="lt1"/>
                 </a:solidFill>
@@ -4837,7 +4776,7 @@
               </a:buClr>
               <a:buSzPts val="25600"/>
               <a:buNone/>
-              <a:defRPr sz="25600">
+              <a:defRPr sz="25598">
                 <a:solidFill>
                   <a:schemeClr val="lt1"/>
                 </a:solidFill>
@@ -4855,7 +4794,7 @@
               </a:buClr>
               <a:buSzPts val="25600"/>
               <a:buNone/>
-              <a:defRPr sz="25600">
+              <a:defRPr sz="25598">
                 <a:solidFill>
                   <a:schemeClr val="lt1"/>
                 </a:solidFill>
@@ -4879,8 +4818,8 @@
         </p:nvSpPr>
         <p:spPr>
           <a:xfrm>
-            <a:off x="40790396" y="30008058"/>
-            <a:ext cx="2633700" cy="2519100"/>
+            <a:off x="40790398" y="40010744"/>
+            <a:ext cx="2633700" cy="3358800"/>
           </a:xfrm>
           <a:prstGeom prst="rect">
             <a:avLst/>
@@ -4965,20 +4904,12 @@
             </a:lvl9pPr>
           </a:lstStyle>
           <a:p>
-            <a:pPr marL="0" lvl="0" indent="0" algn="r" rtl="0">
-              <a:spcBef>
-                <a:spcPts val="0"/>
-              </a:spcBef>
-              <a:spcAft>
-                <a:spcPts val="0"/>
-              </a:spcAft>
-              <a:buNone/>
-            </a:pPr>
             <a:fld id="{00000000-1234-1234-1234-123412341234}" type="slidenum">
-              <a:rPr lang="en-US"/>
+              <a:rPr lang="en-US" smtClean="0"/>
+              <a:pPr/>
               <a:t>‹#›</a:t>
             </a:fld>
-            <a:endParaRPr/>
+            <a:endParaRPr lang="en-US"/>
           </a:p>
         </p:txBody>
       </p:sp>
@@ -5015,8 +4946,8 @@
         </p:nvSpPr>
         <p:spPr>
           <a:xfrm>
-            <a:off x="21945600" y="800"/>
-            <a:ext cx="21945600" cy="32918400"/>
+            <a:off x="21945600" y="1067"/>
+            <a:ext cx="21945600" cy="43891200"/>
           </a:xfrm>
           <a:prstGeom prst="rect">
             <a:avLst/>
@@ -5043,7 +4974,7 @@
               </a:spcAft>
               <a:buNone/>
             </a:pPr>
-            <a:endParaRPr/>
+            <a:endParaRPr sz="1400"/>
           </a:p>
         </p:txBody>
       </p:sp>
@@ -5055,7 +4986,7 @@
         </p:nvCxnSpPr>
         <p:spPr>
           <a:xfrm>
-            <a:off x="24142440" y="28771200"/>
+            <a:off x="24142442" y="38361600"/>
             <a:ext cx="2247900" cy="0"/>
           </a:xfrm>
           <a:prstGeom prst="straightConnector1">
@@ -5085,8 +5016,8 @@
         </p:nvSpPr>
         <p:spPr>
           <a:xfrm>
-            <a:off x="1274400" y="8943040"/>
-            <a:ext cx="19416900" cy="8436600"/>
+            <a:off x="1274402" y="11924053"/>
+            <a:ext cx="19416900" cy="11248800"/>
           </a:xfrm>
           <a:prstGeom prst="rect">
             <a:avLst/>
@@ -5109,7 +5040,7 @@
               </a:buClr>
               <a:buSzPts val="19200"/>
               <a:buNone/>
-              <a:defRPr sz="19200">
+              <a:defRPr sz="19199">
                 <a:solidFill>
                   <a:schemeClr val="dk1"/>
                 </a:solidFill>
@@ -5127,7 +5058,7 @@
               </a:buClr>
               <a:buSzPts val="19200"/>
               <a:buNone/>
-              <a:defRPr sz="19200">
+              <a:defRPr sz="19199">
                 <a:solidFill>
                   <a:schemeClr val="dk1"/>
                 </a:solidFill>
@@ -5145,7 +5076,7 @@
               </a:buClr>
               <a:buSzPts val="19200"/>
               <a:buNone/>
-              <a:defRPr sz="19200">
+              <a:defRPr sz="19199">
                 <a:solidFill>
                   <a:schemeClr val="dk1"/>
                 </a:solidFill>
@@ -5163,7 +5094,7 @@
               </a:buClr>
               <a:buSzPts val="19200"/>
               <a:buNone/>
-              <a:defRPr sz="19200">
+              <a:defRPr sz="19199">
                 <a:solidFill>
                   <a:schemeClr val="dk1"/>
                 </a:solidFill>
@@ -5181,7 +5112,7 @@
               </a:buClr>
               <a:buSzPts val="19200"/>
               <a:buNone/>
-              <a:defRPr sz="19200">
+              <a:defRPr sz="19199">
                 <a:solidFill>
                   <a:schemeClr val="dk1"/>
                 </a:solidFill>
@@ -5199,7 +5130,7 @@
               </a:buClr>
               <a:buSzPts val="19200"/>
               <a:buNone/>
-              <a:defRPr sz="19200">
+              <a:defRPr sz="19199">
                 <a:solidFill>
                   <a:schemeClr val="dk1"/>
                 </a:solidFill>
@@ -5217,7 +5148,7 @@
               </a:buClr>
               <a:buSzPts val="19200"/>
               <a:buNone/>
-              <a:defRPr sz="19200">
+              <a:defRPr sz="19199">
                 <a:solidFill>
                   <a:schemeClr val="dk1"/>
                 </a:solidFill>
@@ -5235,7 +5166,7 @@
               </a:buClr>
               <a:buSzPts val="19200"/>
               <a:buNone/>
-              <a:defRPr sz="19200">
+              <a:defRPr sz="19199">
                 <a:solidFill>
                   <a:schemeClr val="dk1"/>
                 </a:solidFill>
@@ -5253,7 +5184,7 @@
               </a:buClr>
               <a:buSzPts val="19200"/>
               <a:buNone/>
-              <a:defRPr sz="19200">
+              <a:defRPr sz="19199">
                 <a:solidFill>
                   <a:schemeClr val="dk1"/>
                 </a:solidFill>
@@ -5277,8 +5208,8 @@
         </p:nvSpPr>
         <p:spPr>
           <a:xfrm>
-            <a:off x="1274400" y="17506373"/>
-            <a:ext cx="19416900" cy="8611200"/>
+            <a:off x="1274402" y="23341831"/>
+            <a:ext cx="19416900" cy="11481600"/>
           </a:xfrm>
           <a:prstGeom prst="rect">
             <a:avLst/>
@@ -5301,7 +5232,7 @@
               </a:spcAft>
               <a:buSzPts val="11200"/>
               <a:buNone/>
-              <a:defRPr sz="11200"/>
+              <a:defRPr sz="11199"/>
             </a:lvl1pPr>
             <a:lvl2pPr lvl="1" algn="ctr" rtl="0">
               <a:lnSpc>
@@ -5315,7 +5246,7 @@
               </a:spcAft>
               <a:buSzPts val="11200"/>
               <a:buNone/>
-              <a:defRPr sz="11200"/>
+              <a:defRPr sz="11199"/>
             </a:lvl2pPr>
             <a:lvl3pPr lvl="2" algn="ctr" rtl="0">
               <a:lnSpc>
@@ -5329,7 +5260,7 @@
               </a:spcAft>
               <a:buSzPts val="11200"/>
               <a:buNone/>
-              <a:defRPr sz="11200"/>
+              <a:defRPr sz="11199"/>
             </a:lvl3pPr>
             <a:lvl4pPr lvl="3" algn="ctr" rtl="0">
               <a:lnSpc>
@@ -5343,7 +5274,7 @@
               </a:spcAft>
               <a:buSzPts val="11200"/>
               <a:buNone/>
-              <a:defRPr sz="11200"/>
+              <a:defRPr sz="11199"/>
             </a:lvl4pPr>
             <a:lvl5pPr lvl="4" algn="ctr" rtl="0">
               <a:lnSpc>
@@ -5357,7 +5288,7 @@
               </a:spcAft>
               <a:buSzPts val="11200"/>
               <a:buNone/>
-              <a:defRPr sz="11200"/>
+              <a:defRPr sz="11199"/>
             </a:lvl5pPr>
             <a:lvl6pPr lvl="5" algn="ctr" rtl="0">
               <a:lnSpc>
@@ -5371,7 +5302,7 @@
               </a:spcAft>
               <a:buSzPts val="11200"/>
               <a:buNone/>
-              <a:defRPr sz="11200"/>
+              <a:defRPr sz="11199"/>
             </a:lvl6pPr>
             <a:lvl7pPr lvl="6" algn="ctr" rtl="0">
               <a:lnSpc>
@@ -5385,7 +5316,7 @@
               </a:spcAft>
               <a:buSzPts val="11200"/>
               <a:buNone/>
-              <a:defRPr sz="11200"/>
+              <a:defRPr sz="11199"/>
             </a:lvl7pPr>
             <a:lvl8pPr lvl="7" algn="ctr" rtl="0">
               <a:lnSpc>
@@ -5399,7 +5330,7 @@
               </a:spcAft>
               <a:buSzPts val="11200"/>
               <a:buNone/>
-              <a:defRPr sz="11200"/>
+              <a:defRPr sz="11199"/>
             </a:lvl8pPr>
             <a:lvl9pPr lvl="8" algn="ctr" rtl="0">
               <a:lnSpc>
@@ -5413,7 +5344,7 @@
               </a:spcAft>
               <a:buSzPts val="11200"/>
               <a:buNone/>
-              <a:defRPr sz="11200"/>
+              <a:defRPr sz="11199"/>
             </a:lvl9pPr>
           </a:lstStyle>
           <a:p>
@@ -5433,8 +5364,8 @@
         </p:nvSpPr>
         <p:spPr>
           <a:xfrm>
-            <a:off x="23709600" y="4634880"/>
-            <a:ext cx="18417600" cy="23648700"/>
+            <a:off x="23709600" y="6179840"/>
+            <a:ext cx="18417600" cy="31531600"/>
           </a:xfrm>
           <a:prstGeom prst="rect">
             <a:avLst/>
@@ -5445,7 +5376,7 @@
             <a:normAutofit/>
           </a:bodyPr>
           <a:lstStyle>
-            <a:lvl1pPr marL="457200" lvl="0" indent="-838200" rtl="0">
+            <a:lvl1pPr marL="457178" lvl="0" indent="-838158" rtl="0">
               <a:spcBef>
                 <a:spcPts val="0"/>
               </a:spcBef>
@@ -5463,7 +5394,7 @@
                 </a:solidFill>
               </a:defRPr>
             </a:lvl1pPr>
-            <a:lvl2pPr marL="914400" lvl="1" indent="-704850" rtl="0">
+            <a:lvl2pPr marL="914354" lvl="1" indent="-704816" rtl="0">
               <a:spcBef>
                 <a:spcPts val="0"/>
               </a:spcBef>
@@ -5481,7 +5412,7 @@
                 </a:solidFill>
               </a:defRPr>
             </a:lvl2pPr>
-            <a:lvl3pPr marL="1371600" lvl="2" indent="-704850" rtl="0">
+            <a:lvl3pPr marL="1371532" lvl="2" indent="-704816" rtl="0">
               <a:spcBef>
                 <a:spcPts val="0"/>
               </a:spcBef>
@@ -5499,7 +5430,7 @@
                 </a:solidFill>
               </a:defRPr>
             </a:lvl3pPr>
-            <a:lvl4pPr marL="1828800" lvl="3" indent="-704850" rtl="0">
+            <a:lvl4pPr marL="1828709" lvl="3" indent="-704816" rtl="0">
               <a:spcBef>
                 <a:spcPts val="0"/>
               </a:spcBef>
@@ -5517,7 +5448,7 @@
                 </a:solidFill>
               </a:defRPr>
             </a:lvl4pPr>
-            <a:lvl5pPr marL="2286000" lvl="4" indent="-704850" rtl="0">
+            <a:lvl5pPr marL="2285886" lvl="4" indent="-704816" rtl="0">
               <a:spcBef>
                 <a:spcPts val="0"/>
               </a:spcBef>
@@ -5535,7 +5466,7 @@
                 </a:solidFill>
               </a:defRPr>
             </a:lvl5pPr>
-            <a:lvl6pPr marL="2743200" lvl="5" indent="-704850" rtl="0">
+            <a:lvl6pPr marL="2743064" lvl="5" indent="-704816" rtl="0">
               <a:spcBef>
                 <a:spcPts val="0"/>
               </a:spcBef>
@@ -5553,7 +5484,7 @@
                 </a:solidFill>
               </a:defRPr>
             </a:lvl6pPr>
-            <a:lvl7pPr marL="3200400" lvl="6" indent="-704850" rtl="0">
+            <a:lvl7pPr marL="3200240" lvl="6" indent="-704816" rtl="0">
               <a:spcBef>
                 <a:spcPts val="0"/>
               </a:spcBef>
@@ -5571,7 +5502,7 @@
                 </a:solidFill>
               </a:defRPr>
             </a:lvl7pPr>
-            <a:lvl8pPr marL="3657600" lvl="7" indent="-704850" rtl="0">
+            <a:lvl8pPr marL="3657417" lvl="7" indent="-704816" rtl="0">
               <a:spcBef>
                 <a:spcPts val="0"/>
               </a:spcBef>
@@ -5589,7 +5520,7 @@
                 </a:solidFill>
               </a:defRPr>
             </a:lvl8pPr>
-            <a:lvl9pPr marL="4114800" lvl="8" indent="-704850" rtl="0">
+            <a:lvl9pPr marL="4114595" lvl="8" indent="-704816" rtl="0">
               <a:spcBef>
                 <a:spcPts val="0"/>
               </a:spcBef>
@@ -5625,8 +5556,8 @@
         </p:nvSpPr>
         <p:spPr>
           <a:xfrm>
-            <a:off x="40790396" y="30008058"/>
-            <a:ext cx="2633700" cy="2519100"/>
+            <a:off x="40790398" y="40010744"/>
+            <a:ext cx="2633700" cy="3358800"/>
           </a:xfrm>
           <a:prstGeom prst="rect">
             <a:avLst/>
@@ -5711,20 +5642,12 @@
             </a:lvl9pPr>
           </a:lstStyle>
           <a:p>
-            <a:pPr marL="0" lvl="0" indent="0" algn="r" rtl="0">
-              <a:spcBef>
-                <a:spcPts val="0"/>
-              </a:spcBef>
-              <a:spcAft>
-                <a:spcPts val="0"/>
-              </a:spcAft>
-              <a:buNone/>
-            </a:pPr>
             <a:fld id="{00000000-1234-1234-1234-123412341234}" type="slidenum">
-              <a:rPr lang="en-US"/>
+              <a:rPr lang="en-US" smtClean="0"/>
+              <a:pPr/>
               <a:t>‹#›</a:t>
             </a:fld>
-            <a:endParaRPr/>
+            <a:endParaRPr lang="en-US"/>
           </a:p>
         </p:txBody>
       </p:sp>
@@ -5761,7 +5684,7 @@
         </p:nvCxnSpPr>
         <p:spPr>
           <a:xfrm>
-            <a:off x="2040961" y="30336000"/>
+            <a:off x="2040962" y="40448000"/>
             <a:ext cx="39824700" cy="0"/>
           </a:xfrm>
           <a:prstGeom prst="straightConnector1">
@@ -5787,7 +5710,7 @@
         </p:nvCxnSpPr>
         <p:spPr>
           <a:xfrm>
-            <a:off x="2040951" y="2660160"/>
+            <a:off x="2040951" y="3546880"/>
             <a:ext cx="879900" cy="0"/>
           </a:xfrm>
           <a:prstGeom prst="straightConnector1">
@@ -5817,8 +5740,8 @@
         </p:nvSpPr>
         <p:spPr>
           <a:xfrm>
-            <a:off x="1574483" y="27046560"/>
-            <a:ext cx="40265400" cy="2519100"/>
+            <a:off x="1574483" y="36062080"/>
+            <a:ext cx="40265400" cy="3358800"/>
           </a:xfrm>
           <a:prstGeom prst="rect">
             <a:avLst/>
@@ -5829,7 +5752,7 @@
             <a:normAutofit/>
           </a:bodyPr>
           <a:lstStyle>
-            <a:lvl1pPr marL="457200" lvl="0" indent="-228600" rtl="0">
+            <a:lvl1pPr marL="457178" lvl="0" indent="-228588" rtl="0">
               <a:lnSpc>
                 <a:spcPct val="100000"/>
               </a:lnSpc>
@@ -5861,8 +5784,8 @@
         </p:nvSpPr>
         <p:spPr>
           <a:xfrm>
-            <a:off x="40790396" y="30008058"/>
-            <a:ext cx="2633700" cy="2519100"/>
+            <a:off x="40790398" y="40010744"/>
+            <a:ext cx="2633700" cy="3358800"/>
           </a:xfrm>
           <a:prstGeom prst="rect">
             <a:avLst/>
@@ -5911,20 +5834,12 @@
             </a:lvl9pPr>
           </a:lstStyle>
           <a:p>
-            <a:pPr marL="0" lvl="0" indent="0" algn="r" rtl="0">
-              <a:spcBef>
-                <a:spcPts val="0"/>
-              </a:spcBef>
-              <a:spcAft>
-                <a:spcPts val="0"/>
-              </a:spcAft>
-              <a:buNone/>
-            </a:pPr>
             <a:fld id="{00000000-1234-1234-1234-123412341234}" type="slidenum">
-              <a:rPr lang="en-US"/>
+              <a:rPr lang="en-US" smtClean="0"/>
+              <a:pPr/>
               <a:t>‹#›</a:t>
             </a:fld>
-            <a:endParaRPr/>
+            <a:endParaRPr lang="en-US"/>
           </a:p>
         </p:txBody>
       </p:sp>
@@ -5973,8 +5888,8 @@
         </p:nvSpPr>
         <p:spPr>
           <a:xfrm>
-            <a:off x="11521200" y="3686080"/>
-            <a:ext cx="30343800" cy="4066500"/>
+            <a:off x="11521200" y="4914773"/>
+            <a:ext cx="30343800" cy="5422000"/>
           </a:xfrm>
           <a:prstGeom prst="rect">
             <a:avLst/>
@@ -6214,8 +6129,8 @@
         </p:nvSpPr>
         <p:spPr>
           <a:xfrm>
-            <a:off x="11568539" y="10212966"/>
-            <a:ext cx="30343800" cy="19215300"/>
+            <a:off x="11568539" y="13617288"/>
+            <a:ext cx="30343800" cy="25620400"/>
           </a:xfrm>
           <a:prstGeom prst="rect">
             <a:avLst/>
@@ -6482,8 +6397,8 @@
         </p:nvSpPr>
         <p:spPr>
           <a:xfrm>
-            <a:off x="40790396" y="30008058"/>
-            <a:ext cx="2633700" cy="2519100"/>
+            <a:off x="40790398" y="40010744"/>
+            <a:ext cx="2633700" cy="3358800"/>
           </a:xfrm>
           <a:prstGeom prst="rect">
             <a:avLst/>
@@ -6608,20 +6523,12 @@
             </a:lvl9pPr>
           </a:lstStyle>
           <a:p>
-            <a:pPr marL="0" lvl="0" indent="0" algn="r" rtl="0">
-              <a:spcBef>
-                <a:spcPts val="0"/>
-              </a:spcBef>
-              <a:spcAft>
-                <a:spcPts val="0"/>
-              </a:spcAft>
-              <a:buNone/>
-            </a:pPr>
             <a:fld id="{00000000-1234-1234-1234-123412341234}" type="slidenum">
-              <a:rPr lang="en-US"/>
+              <a:rPr lang="en-US" smtClean="0"/>
+              <a:pPr/>
               <a:t>‹#›</a:t>
             </a:fld>
-            <a:endParaRPr/>
+            <a:endParaRPr lang="en-US"/>
           </a:p>
         </p:txBody>
       </p:sp>
@@ -7368,8 +7275,8 @@
         </p:nvSpPr>
         <p:spPr>
           <a:xfrm>
-            <a:off x="6816425" y="617625"/>
-            <a:ext cx="33822000" cy="3632700"/>
+            <a:off x="6553300" y="503327"/>
+            <a:ext cx="33822000" cy="3631723"/>
           </a:xfrm>
           <a:prstGeom prst="rect">
             <a:avLst/>
@@ -7385,104 +7292,32 @@
           </a:bodyPr>
           <a:lstStyle/>
           <a:p>
-            <a:pPr marL="0" marR="0" lvl="0" indent="0" algn="l" rtl="0">
-              <a:lnSpc>
-                <a:spcPct val="100000"/>
-              </a:lnSpc>
-              <a:spcBef>
-                <a:spcPts val="0"/>
-              </a:spcBef>
-              <a:spcAft>
-                <a:spcPts val="0"/>
-              </a:spcAft>
-              <a:buClr>
-                <a:srgbClr val="000000"/>
-              </a:buClr>
+            <a:pPr>
               <a:buSzPts val="8800"/>
-              <a:buFont typeface="Arial"/>
-              <a:buNone/>
             </a:pPr>
             <a:r>
-              <a:rPr lang="en-US" sz="8800" b="1" i="0" u="none" strike="noStrike" cap="none" dirty="0">
-                <a:solidFill>
-                  <a:schemeClr val="lt1"/>
-                </a:solidFill>
-                <a:latin typeface="Arial"/>
-                <a:ea typeface="Arial"/>
-                <a:cs typeface="Arial"/>
-                <a:sym typeface="Arial"/>
+              <a:rPr lang="en-US" sz="8800" b="1" dirty="0">
+                <a:solidFill>
+                  <a:schemeClr val="lt1"/>
+                </a:solidFill>
               </a:rPr>
               <a:t> Knight Foundation School of Computing and Information Sciences </a:t>
             </a:r>
-            <a:endParaRPr sz="1400" b="0" i="0" u="none" strike="noStrike" cap="none" dirty="0">
-              <a:solidFill>
-                <a:srgbClr val="000000"/>
-              </a:solidFill>
-              <a:latin typeface="Arial"/>
-              <a:ea typeface="Arial"/>
-              <a:cs typeface="Arial"/>
-              <a:sym typeface="Arial"/>
-            </a:endParaRPr>
+            <a:endParaRPr dirty="0"/>
           </a:p>
           <a:p>
-            <a:pPr marL="0" marR="0" lvl="0" indent="0" algn="l" rtl="0">
-              <a:lnSpc>
-                <a:spcPct val="100000"/>
-              </a:lnSpc>
-              <a:spcBef>
-                <a:spcPts val="0"/>
-              </a:spcBef>
-              <a:spcAft>
-                <a:spcPts val="0"/>
-              </a:spcAft>
-              <a:buClr>
-                <a:srgbClr val="000000"/>
-              </a:buClr>
+            <a:pPr>
               <a:buSzPts val="5400"/>
-              <a:buFont typeface="Arial"/>
-              <a:buNone/>
             </a:pPr>
             <a:r>
-              <a:rPr lang="en-US" sz="5400" b="0" i="1" u="none" strike="noStrike" cap="none" dirty="0">
-                <a:solidFill>
-                  <a:schemeClr val="lt1"/>
-                </a:solidFill>
-                <a:latin typeface="Arial"/>
-                <a:ea typeface="Arial"/>
-                <a:cs typeface="Arial"/>
-                <a:sym typeface="Arial"/>
+              <a:rPr lang="en-US" sz="5400" i="1" dirty="0">
+                <a:solidFill>
+                  <a:schemeClr val="lt1"/>
+                </a:solidFill>
               </a:rPr>
-              <a:t>Spring 2023 Capston</a:t>
+              <a:t>Spring 2023 Capstone II Project</a:t>
             </a:r>
-            <a:r>
-              <a:rPr lang="en-US" sz="5400" i="1" dirty="0">
-                <a:solidFill>
-                  <a:schemeClr val="lt1"/>
-                </a:solidFill>
-              </a:rPr>
-              <a:t>e II </a:t>
-            </a:r>
-            <a:r>
-              <a:rPr lang="en-US" sz="5400" b="0" i="1" u="none" strike="noStrike" cap="none" dirty="0">
-                <a:solidFill>
-                  <a:schemeClr val="lt1"/>
-                </a:solidFill>
-                <a:latin typeface="Arial"/>
-                <a:ea typeface="Arial"/>
-                <a:cs typeface="Arial"/>
-                <a:sym typeface="Arial"/>
-              </a:rPr>
-              <a:t>Project</a:t>
-            </a:r>
-            <a:endParaRPr sz="1400" b="0" i="0" u="none" strike="noStrike" cap="none" dirty="0">
-              <a:solidFill>
-                <a:srgbClr val="000000"/>
-              </a:solidFill>
-              <a:latin typeface="Arial"/>
-              <a:ea typeface="Arial"/>
-              <a:cs typeface="Arial"/>
-              <a:sym typeface="Arial"/>
-            </a:endParaRPr>
+            <a:endParaRPr dirty="0"/>
           </a:p>
         </p:txBody>
       </p:sp>
@@ -7494,7 +7329,7 @@
         </p:nvSpPr>
         <p:spPr>
           <a:xfrm>
-            <a:off x="6816436" y="3931687"/>
+            <a:off x="6553311" y="3817387"/>
             <a:ext cx="35204400" cy="3229382"/>
           </a:xfrm>
           <a:prstGeom prst="rect">
@@ -7511,32 +7346,17 @@
           </a:bodyPr>
           <a:lstStyle/>
           <a:p>
-            <a:pPr marL="0" marR="0" lvl="0" indent="0" algn="l" rtl="0">
-              <a:lnSpc>
-                <a:spcPct val="100000"/>
-              </a:lnSpc>
-              <a:spcBef>
-                <a:spcPts val="0"/>
-              </a:spcBef>
-              <a:spcAft>
-                <a:spcPts val="0"/>
-              </a:spcAft>
+            <a:pPr>
               <a:buClr>
                 <a:srgbClr val="00FFFF"/>
               </a:buClr>
               <a:buSzPts val="10000"/>
-              <a:buFont typeface="Arial"/>
-              <a:buNone/>
             </a:pPr>
             <a:r>
-              <a:rPr lang="en-US" sz="10000" b="1" i="0" u="none" strike="noStrike" cap="none" dirty="0">
-                <a:solidFill>
-                  <a:schemeClr val="lt1"/>
-                </a:solidFill>
-                <a:latin typeface="Arial"/>
-                <a:ea typeface="Arial"/>
-                <a:cs typeface="Arial"/>
-                <a:sym typeface="Arial"/>
+              <a:rPr lang="en-US" sz="10000" b="1" dirty="0">
+                <a:solidFill>
+                  <a:schemeClr val="lt1"/>
+                </a:solidFill>
               </a:rPr>
               <a:t>Vocabulary In Reading Studies (VIRS)</a:t>
             </a:r>
@@ -7547,32 +7367,17 @@
             </a:endParaRPr>
           </a:p>
           <a:p>
-            <a:pPr marL="0" marR="0" lvl="0" indent="0" algn="l" rtl="0">
-              <a:lnSpc>
-                <a:spcPct val="100000"/>
-              </a:lnSpc>
-              <a:spcBef>
-                <a:spcPts val="0"/>
-              </a:spcBef>
-              <a:spcAft>
-                <a:spcPts val="0"/>
-              </a:spcAft>
+            <a:pPr>
               <a:buClr>
                 <a:srgbClr val="00FFFF"/>
               </a:buClr>
               <a:buSzPts val="10000"/>
-              <a:buFont typeface="Arial"/>
-              <a:buNone/>
             </a:pPr>
             <a:r>
-              <a:rPr lang="en-US" sz="3500" b="1" i="0" u="none" strike="noStrike" cap="none" dirty="0">
-                <a:solidFill>
-                  <a:schemeClr val="lt1"/>
-                </a:solidFill>
-                <a:latin typeface="Arial"/>
-                <a:ea typeface="Arial"/>
-                <a:cs typeface="Arial"/>
-                <a:sym typeface="Arial"/>
+              <a:rPr lang="en-US" sz="3500" b="1" dirty="0">
+                <a:solidFill>
+                  <a:schemeClr val="lt1"/>
+                </a:solidFill>
               </a:rPr>
               <a:t>Student: </a:t>
             </a:r>
@@ -7584,163 +7389,88 @@
               </a:rPr>
               <a:t>Evers Perez</a:t>
             </a:r>
-            <a:endParaRPr sz="1400" b="0" i="0" u="none" strike="noStrike" cap="none" dirty="0">
-              <a:solidFill>
-                <a:srgbClr val="000000"/>
-              </a:solidFill>
-              <a:latin typeface="Arial"/>
-              <a:ea typeface="Arial"/>
-              <a:cs typeface="Arial"/>
-              <a:sym typeface="Arial"/>
-            </a:endParaRPr>
+            <a:endParaRPr dirty="0"/>
           </a:p>
           <a:p>
-            <a:pPr marL="0" marR="0" lvl="0" indent="0" algn="l" rtl="0">
-              <a:lnSpc>
-                <a:spcPct val="100000"/>
-              </a:lnSpc>
-              <a:spcBef>
-                <a:spcPts val="0"/>
-              </a:spcBef>
-              <a:spcAft>
-                <a:spcPts val="0"/>
-              </a:spcAft>
+            <a:pPr>
               <a:buClr>
                 <a:schemeClr val="lt1"/>
               </a:buClr>
               <a:buSzPts val="3500"/>
-              <a:buFont typeface="Arial"/>
-              <a:buNone/>
             </a:pPr>
             <a:r>
-              <a:rPr lang="en-US" sz="3500" b="1" i="0" u="none" strike="noStrike" cap="none" dirty="0">
-                <a:solidFill>
-                  <a:schemeClr val="lt1"/>
-                </a:solidFill>
-                <a:latin typeface="Arial"/>
-                <a:ea typeface="Arial"/>
-                <a:cs typeface="Arial"/>
-                <a:sym typeface="Arial"/>
+              <a:rPr lang="en-US" sz="3500" b="1" dirty="0">
+                <a:solidFill>
+                  <a:schemeClr val="lt1"/>
+                </a:solidFill>
               </a:rPr>
               <a:t>Mentor:</a:t>
             </a:r>
             <a:r>
-              <a:rPr lang="en-US" sz="3500" b="0" i="0" u="none" strike="noStrike" cap="none" dirty="0">
-                <a:solidFill>
-                  <a:schemeClr val="lt1"/>
-                </a:solidFill>
-                <a:latin typeface="Arial"/>
-                <a:ea typeface="Arial"/>
-                <a:cs typeface="Arial"/>
-                <a:sym typeface="Arial"/>
+              <a:rPr lang="en-US" sz="3500" dirty="0">
+                <a:solidFill>
+                  <a:schemeClr val="lt1"/>
+                </a:solidFill>
               </a:rPr>
               <a:t> Eric Dwyer</a:t>
             </a:r>
-            <a:endParaRPr lang="en-US" sz="3500" dirty="0">
-              <a:solidFill>
-                <a:schemeClr val="lt1"/>
-              </a:solidFill>
-            </a:endParaRPr>
           </a:p>
           <a:p>
-            <a:pPr marL="0" marR="0" lvl="0" indent="0" algn="l" rtl="0">
-              <a:lnSpc>
-                <a:spcPct val="100000"/>
-              </a:lnSpc>
-              <a:spcBef>
-                <a:spcPts val="0"/>
-              </a:spcBef>
-              <a:spcAft>
-                <a:spcPts val="0"/>
-              </a:spcAft>
+            <a:pPr>
               <a:buClr>
                 <a:schemeClr val="lt1"/>
               </a:buClr>
               <a:buSzPts val="3500"/>
-              <a:buFont typeface="Arial"/>
-              <a:buNone/>
             </a:pPr>
             <a:r>
-              <a:rPr lang="en-US" sz="3500" b="1" i="0" u="none" strike="noStrike" cap="none" dirty="0">
-                <a:solidFill>
-                  <a:schemeClr val="lt1"/>
-                </a:solidFill>
-                <a:latin typeface="Arial"/>
-                <a:ea typeface="Arial"/>
-                <a:cs typeface="Arial"/>
-                <a:sym typeface="Arial"/>
+              <a:rPr lang="en-US" sz="3500" b="1" dirty="0">
+                <a:solidFill>
+                  <a:schemeClr val="lt1"/>
+                </a:solidFill>
               </a:rPr>
               <a:t>Instructor/Faculty:</a:t>
             </a:r>
             <a:r>
-              <a:rPr lang="en-US" sz="3500" b="0" i="0" u="none" strike="noStrike" cap="none" dirty="0">
-                <a:solidFill>
-                  <a:schemeClr val="lt1"/>
-                </a:solidFill>
-                <a:latin typeface="Arial"/>
-                <a:ea typeface="Arial"/>
-                <a:cs typeface="Arial"/>
-                <a:sym typeface="Arial"/>
+              <a:rPr lang="en-US" sz="3500" dirty="0">
+                <a:solidFill>
+                  <a:schemeClr val="lt1"/>
+                </a:solidFill>
               </a:rPr>
               <a:t> Dr. Masoud </a:t>
             </a:r>
             <a:r>
-              <a:rPr lang="en-US" sz="3500" b="0" i="0" u="none" strike="noStrike" cap="none" dirty="0" err="1">
-                <a:solidFill>
-                  <a:schemeClr val="lt1"/>
-                </a:solidFill>
-                <a:latin typeface="Arial"/>
-                <a:ea typeface="Arial"/>
-                <a:cs typeface="Arial"/>
-                <a:sym typeface="Arial"/>
+              <a:rPr lang="en-US" sz="3500" dirty="0" err="1">
+                <a:solidFill>
+                  <a:schemeClr val="lt1"/>
+                </a:solidFill>
               </a:rPr>
               <a:t>Sadjadi</a:t>
             </a:r>
             <a:r>
-              <a:rPr lang="en-US" sz="3500" b="0" i="0" u="none" strike="noStrike" cap="none" dirty="0">
-                <a:solidFill>
-                  <a:schemeClr val="lt1"/>
-                </a:solidFill>
-                <a:latin typeface="Arial"/>
-                <a:ea typeface="Arial"/>
-                <a:cs typeface="Arial"/>
-                <a:sym typeface="Arial"/>
+              <a:rPr lang="en-US" sz="3500" dirty="0">
+                <a:solidFill>
+                  <a:schemeClr val="lt1"/>
+                </a:solidFill>
               </a:rPr>
               <a:t>,</a:t>
             </a:r>
             <a:r>
-              <a:rPr lang="en-US" sz="3500" b="0" i="1" u="none" strike="noStrike" cap="none" dirty="0">
-                <a:solidFill>
-                  <a:schemeClr val="lt1"/>
-                </a:solidFill>
-                <a:latin typeface="Arial"/>
-                <a:ea typeface="Arial"/>
-                <a:cs typeface="Arial"/>
-                <a:sym typeface="Arial"/>
+              <a:rPr lang="en-US" sz="3500" i="1" dirty="0">
+                <a:solidFill>
+                  <a:schemeClr val="lt1"/>
+                </a:solidFill>
               </a:rPr>
               <a:t> </a:t>
             </a:r>
             <a:r>
-              <a:rPr lang="en-US" sz="3500" b="0" i="0" u="none" strike="noStrike" cap="none" dirty="0">
-                <a:solidFill>
-                  <a:schemeClr val="lt1"/>
-                </a:solidFill>
-                <a:latin typeface="Arial"/>
-                <a:ea typeface="Arial"/>
-                <a:cs typeface="Arial"/>
-                <a:sym typeface="Arial"/>
+              <a:rPr lang="en-US" sz="3500" dirty="0">
+                <a:solidFill>
+                  <a:schemeClr val="lt1"/>
+                </a:solidFill>
               </a:rPr>
               <a:t>Florida International University</a:t>
             </a:r>
-            <a:endParaRPr sz="1400" b="0" i="0" u="none" strike="noStrike" cap="none" dirty="0">
-              <a:solidFill>
-                <a:srgbClr val="000000"/>
-              </a:solidFill>
-              <a:latin typeface="Arial"/>
-              <a:ea typeface="Arial"/>
-              <a:cs typeface="Arial"/>
-              <a:sym typeface="Arial"/>
-            </a:endParaRPr>
+            <a:endParaRPr dirty="0"/>
           </a:p>
         </p:txBody>
       </p:sp>
@@ -7752,8 +7482,8 @@
         </p:nvSpPr>
         <p:spPr>
           <a:xfrm>
-            <a:off x="22361225" y="7692702"/>
-            <a:ext cx="4114800" cy="548100"/>
+            <a:off x="22098100" y="7813552"/>
+            <a:ext cx="4114800" cy="547879"/>
           </a:xfrm>
           <a:prstGeom prst="rect">
             <a:avLst/>
@@ -7769,43 +7499,21 @@
           </a:bodyPr>
           <a:lstStyle/>
           <a:p>
-            <a:pPr marL="0" marR="0" lvl="0" indent="0" algn="ctr" rtl="0">
-              <a:lnSpc>
-                <a:spcPct val="100000"/>
-              </a:lnSpc>
-              <a:spcBef>
-                <a:spcPts val="0"/>
-              </a:spcBef>
-              <a:spcAft>
-                <a:spcPts val="0"/>
-              </a:spcAft>
-              <a:buClr>
-                <a:srgbClr val="000000"/>
-              </a:buClr>
+            <a:pPr algn="ctr">
               <a:buSzPts val="3075"/>
-              <a:buFont typeface="Arial"/>
-              <a:buNone/>
             </a:pPr>
             <a:r>
-              <a:rPr lang="en-US" sz="3075" b="1" i="0" u="none" strike="noStrike" cap="none">
-                <a:solidFill>
-                  <a:schemeClr val="lt1"/>
-                </a:solidFill>
-                <a:latin typeface="Arial"/>
-                <a:ea typeface="Arial"/>
-                <a:cs typeface="Arial"/>
-                <a:sym typeface="Arial"/>
+              <a:rPr lang="en-US" sz="3075" b="1">
+                <a:solidFill>
+                  <a:schemeClr val="lt1"/>
+                </a:solidFill>
               </a:rPr>
               <a:t>PROBLEM</a:t>
             </a:r>
-            <a:endParaRPr sz="1400" b="0" i="0" u="none" strike="noStrike" cap="none">
+            <a:endParaRPr>
               <a:solidFill>
                 <a:schemeClr val="lt1"/>
               </a:solidFill>
-              <a:latin typeface="Arial"/>
-              <a:ea typeface="Arial"/>
-              <a:cs typeface="Arial"/>
-              <a:sym typeface="Arial"/>
             </a:endParaRPr>
           </a:p>
         </p:txBody>
@@ -7818,8 +7526,8 @@
         </p:nvSpPr>
         <p:spPr>
           <a:xfrm>
-            <a:off x="9796031" y="17738814"/>
-            <a:ext cx="4114800" cy="548100"/>
+            <a:off x="13637552" y="17484435"/>
+            <a:ext cx="4114800" cy="547879"/>
           </a:xfrm>
           <a:prstGeom prst="rect">
             <a:avLst/>
@@ -7835,22 +7543,8 @@
           </a:bodyPr>
           <a:lstStyle/>
           <a:p>
-            <a:pPr marL="0" marR="0" lvl="0" indent="0" algn="ctr" rtl="0">
-              <a:lnSpc>
-                <a:spcPct val="100000"/>
-              </a:lnSpc>
-              <a:spcBef>
-                <a:spcPts val="0"/>
-              </a:spcBef>
-              <a:spcAft>
-                <a:spcPts val="0"/>
-              </a:spcAft>
-              <a:buClr>
-                <a:srgbClr val="000000"/>
-              </a:buClr>
+            <a:pPr algn="ctr">
               <a:buSzPts val="3075"/>
-              <a:buFont typeface="Arial"/>
-              <a:buNone/>
             </a:pPr>
             <a:r>
               <a:rPr lang="en-US" sz="3075" b="1" dirty="0">
@@ -7860,14 +7554,10 @@
               </a:rPr>
               <a:t>System Design</a:t>
             </a:r>
-            <a:endParaRPr sz="1400" b="0" i="0" u="none" strike="noStrike" cap="none" dirty="0">
+            <a:endParaRPr dirty="0">
               <a:solidFill>
                 <a:schemeClr val="lt1"/>
               </a:solidFill>
-              <a:latin typeface="Arial"/>
-              <a:ea typeface="Arial"/>
-              <a:cs typeface="Arial"/>
-              <a:sym typeface="Arial"/>
             </a:endParaRPr>
           </a:p>
         </p:txBody>
@@ -7880,8 +7570,8 @@
         </p:nvSpPr>
         <p:spPr>
           <a:xfrm>
-            <a:off x="35628250" y="7692688"/>
-            <a:ext cx="4114800" cy="548100"/>
+            <a:off x="35365125" y="7916132"/>
+            <a:ext cx="4114800" cy="547879"/>
           </a:xfrm>
           <a:prstGeom prst="rect">
             <a:avLst/>
@@ -7897,43 +7587,21 @@
           </a:bodyPr>
           <a:lstStyle/>
           <a:p>
-            <a:pPr marL="0" marR="0" lvl="0" indent="0" algn="ctr" rtl="0">
-              <a:lnSpc>
-                <a:spcPct val="100000"/>
-              </a:lnSpc>
-              <a:spcBef>
-                <a:spcPts val="0"/>
-              </a:spcBef>
-              <a:spcAft>
-                <a:spcPts val="0"/>
-              </a:spcAft>
-              <a:buClr>
-                <a:srgbClr val="000000"/>
-              </a:buClr>
+            <a:pPr algn="ctr">
               <a:buSzPts val="3075"/>
-              <a:buFont typeface="Arial"/>
-              <a:buNone/>
             </a:pPr>
             <a:r>
-              <a:rPr lang="en-US" sz="3075" b="1" i="0" u="none" strike="noStrike" cap="none" dirty="0">
-                <a:solidFill>
-                  <a:schemeClr val="lt1"/>
-                </a:solidFill>
-                <a:latin typeface="Arial"/>
-                <a:ea typeface="Arial"/>
-                <a:cs typeface="Arial"/>
-                <a:sym typeface="Arial"/>
+              <a:rPr lang="en-US" sz="3075" b="1" dirty="0">
+                <a:solidFill>
+                  <a:schemeClr val="lt1"/>
+                </a:solidFill>
               </a:rPr>
               <a:t>REQUIREMENTS</a:t>
             </a:r>
-            <a:endParaRPr sz="1400" b="0" i="0" u="none" strike="noStrike" cap="none" dirty="0">
+            <a:endParaRPr dirty="0">
               <a:solidFill>
                 <a:schemeClr val="lt1"/>
               </a:solidFill>
-              <a:latin typeface="Arial"/>
-              <a:ea typeface="Arial"/>
-              <a:cs typeface="Arial"/>
-              <a:sym typeface="Arial"/>
             </a:endParaRPr>
           </a:p>
         </p:txBody>
@@ -7946,8 +7614,8 @@
         </p:nvSpPr>
         <p:spPr>
           <a:xfrm>
-            <a:off x="35628256" y="17738790"/>
-            <a:ext cx="4114800" cy="548100"/>
+            <a:off x="35365125" y="28741098"/>
+            <a:ext cx="4114800" cy="547879"/>
           </a:xfrm>
           <a:prstGeom prst="rect">
             <a:avLst/>
@@ -7963,43 +7631,21 @@
           </a:bodyPr>
           <a:lstStyle/>
           <a:p>
-            <a:pPr marL="0" marR="0" lvl="0" indent="0" algn="ctr" rtl="0">
-              <a:lnSpc>
-                <a:spcPct val="100000"/>
-              </a:lnSpc>
-              <a:spcBef>
-                <a:spcPts val="0"/>
-              </a:spcBef>
-              <a:spcAft>
-                <a:spcPts val="0"/>
-              </a:spcAft>
-              <a:buClr>
-                <a:srgbClr val="000000"/>
-              </a:buClr>
+            <a:pPr algn="ctr">
               <a:buSzPts val="3075"/>
-              <a:buFont typeface="Arial"/>
-              <a:buNone/>
             </a:pPr>
             <a:r>
-              <a:rPr lang="en-US" sz="3075" b="1" i="0" u="none" strike="noStrike" cap="none">
-                <a:solidFill>
-                  <a:schemeClr val="lt1"/>
-                </a:solidFill>
-                <a:latin typeface="Arial"/>
-                <a:ea typeface="Arial"/>
-                <a:cs typeface="Arial"/>
-                <a:sym typeface="Arial"/>
+              <a:rPr lang="en-US" sz="3075" b="1" dirty="0">
+                <a:solidFill>
+                  <a:schemeClr val="lt1"/>
+                </a:solidFill>
               </a:rPr>
               <a:t>SUMMARY</a:t>
             </a:r>
-            <a:endParaRPr sz="1400" b="0" i="0" u="none" strike="noStrike" cap="none">
+            <a:endParaRPr dirty="0">
               <a:solidFill>
                 <a:schemeClr val="lt1"/>
               </a:solidFill>
-              <a:latin typeface="Arial"/>
-              <a:ea typeface="Arial"/>
-              <a:cs typeface="Arial"/>
-              <a:sym typeface="Arial"/>
             </a:endParaRPr>
           </a:p>
         </p:txBody>
@@ -8012,7 +7658,7 @@
         </p:nvSpPr>
         <p:spPr>
           <a:xfrm>
-            <a:off x="6655820" y="31775400"/>
+            <a:off x="6335227" y="42945578"/>
             <a:ext cx="21444300" cy="813336"/>
           </a:xfrm>
           <a:prstGeom prst="rect">
@@ -8029,44 +7675,21 @@
           </a:bodyPr>
           <a:lstStyle/>
           <a:p>
-            <a:pPr marL="0" marR="0" lvl="0" indent="0" algn="l" rtl="0">
-              <a:lnSpc>
-                <a:spcPct val="100000"/>
-              </a:lnSpc>
-              <a:spcBef>
-                <a:spcPts val="0"/>
-              </a:spcBef>
-              <a:spcAft>
-                <a:spcPts val="0"/>
-              </a:spcAft>
+            <a:pPr>
               <a:buClr>
                 <a:srgbClr val="3333CC"/>
               </a:buClr>
               <a:buSzPts val="2400"/>
-              <a:buFont typeface="Arial"/>
-              <a:buNone/>
             </a:pPr>
             <a:r>
-              <a:rPr lang="en-US" sz="2400" b="0" i="0" u="none" strike="noStrike" cap="none" dirty="0">
+              <a:rPr lang="en-US" sz="2400" dirty="0">
                 <a:solidFill>
                   <a:schemeClr val="lt2"/>
                 </a:solidFill>
-                <a:latin typeface="Arial"/>
-                <a:ea typeface="Arial"/>
-                <a:cs typeface="Arial"/>
-                <a:sym typeface="Arial"/>
               </a:rPr>
               <a:t>Thank you, Eric, for all the guidance you provided us. We truly hope the future of this application is bright and we’re more than grateful for having participated in this.</a:t>
             </a:r>
-            <a:endParaRPr sz="1400" b="0" i="0" u="none" strike="noStrike" cap="none" dirty="0">
-              <a:solidFill>
-                <a:srgbClr val="000000"/>
-              </a:solidFill>
-              <a:latin typeface="Arial"/>
-              <a:ea typeface="Arial"/>
-              <a:cs typeface="Arial"/>
-              <a:sym typeface="Arial"/>
-            </a:endParaRPr>
+            <a:endParaRPr dirty="0"/>
           </a:p>
         </p:txBody>
       </p:sp>
@@ -8078,8 +7701,8 @@
         </p:nvSpPr>
         <p:spPr>
           <a:xfrm>
-            <a:off x="6620651" y="31264309"/>
-            <a:ext cx="4578237" cy="547919"/>
+            <a:off x="6070029" y="42397699"/>
+            <a:ext cx="4578237" cy="547879"/>
           </a:xfrm>
           <a:prstGeom prst="rect">
             <a:avLst/>
@@ -8095,44 +7718,18 @@
           </a:bodyPr>
           <a:lstStyle/>
           <a:p>
-            <a:pPr marL="0" marR="0" lvl="0" indent="0" algn="ctr" rtl="0">
-              <a:lnSpc>
-                <a:spcPct val="100000"/>
-              </a:lnSpc>
-              <a:spcBef>
-                <a:spcPts val="0"/>
-              </a:spcBef>
-              <a:spcAft>
-                <a:spcPts val="0"/>
-              </a:spcAft>
-              <a:buClr>
-                <a:srgbClr val="000000"/>
-              </a:buClr>
+            <a:pPr algn="ctr">
               <a:buSzPts val="3075"/>
-              <a:buFont typeface="Arial"/>
-              <a:buNone/>
             </a:pPr>
             <a:r>
-              <a:rPr lang="en-US" sz="3075" b="1" i="0" u="none" strike="noStrike" cap="none">
+              <a:rPr lang="en-US" sz="3075" b="1" dirty="0">
                 <a:solidFill>
                   <a:srgbClr val="00FFFF"/>
                 </a:solidFill>
-                <a:latin typeface="Arial"/>
-                <a:ea typeface="Arial"/>
-                <a:cs typeface="Arial"/>
-                <a:sym typeface="Arial"/>
               </a:rPr>
               <a:t>ACKNOWLEDGEMENT</a:t>
             </a:r>
-            <a:endParaRPr sz="1400" b="0" i="0" u="none" strike="noStrike" cap="none">
-              <a:solidFill>
-                <a:srgbClr val="000000"/>
-              </a:solidFill>
-              <a:latin typeface="Arial"/>
-              <a:ea typeface="Arial"/>
-              <a:cs typeface="Arial"/>
-              <a:sym typeface="Arial"/>
-            </a:endParaRPr>
+            <a:endParaRPr dirty="0"/>
           </a:p>
         </p:txBody>
       </p:sp>
@@ -8151,7 +7748,7 @@
         </p:blipFill>
         <p:spPr>
           <a:xfrm>
-            <a:off x="263125" y="5178222"/>
+            <a:off x="0" y="5063923"/>
             <a:ext cx="5223840" cy="3126149"/>
           </a:xfrm>
           <a:prstGeom prst="rect">
@@ -8178,7 +7775,7 @@
         </p:blipFill>
         <p:spPr>
           <a:xfrm>
-            <a:off x="263125" y="617625"/>
+            <a:off x="0" y="503325"/>
             <a:ext cx="5457826" cy="3126160"/>
           </a:xfrm>
           <a:prstGeom prst="rect">
@@ -8198,8 +7795,8 @@
         </p:nvSpPr>
         <p:spPr>
           <a:xfrm>
-            <a:off x="9796025" y="7927852"/>
-            <a:ext cx="4114800" cy="548100"/>
+            <a:off x="9532900" y="7813553"/>
+            <a:ext cx="4114800" cy="547879"/>
           </a:xfrm>
           <a:prstGeom prst="rect">
             <a:avLst/>
@@ -8215,43 +7812,21 @@
           </a:bodyPr>
           <a:lstStyle/>
           <a:p>
-            <a:pPr marL="0" marR="0" lvl="0" indent="0" algn="ctr" rtl="0">
-              <a:lnSpc>
-                <a:spcPct val="100000"/>
-              </a:lnSpc>
-              <a:spcBef>
-                <a:spcPts val="0"/>
-              </a:spcBef>
-              <a:spcAft>
-                <a:spcPts val="0"/>
-              </a:spcAft>
-              <a:buClr>
-                <a:srgbClr val="000000"/>
-              </a:buClr>
+            <a:pPr algn="ctr">
               <a:buSzPts val="3075"/>
-              <a:buFont typeface="Arial"/>
-              <a:buNone/>
             </a:pPr>
             <a:r>
-              <a:rPr lang="en-US" sz="3075" b="1" i="0" u="none" strike="noStrike" cap="none" dirty="0">
-                <a:solidFill>
-                  <a:schemeClr val="lt1"/>
-                </a:solidFill>
-                <a:latin typeface="Arial"/>
-                <a:ea typeface="Arial"/>
-                <a:cs typeface="Arial"/>
-                <a:sym typeface="Arial"/>
+              <a:rPr lang="en-US" sz="3075" b="1" dirty="0">
+                <a:solidFill>
+                  <a:schemeClr val="lt1"/>
+                </a:solidFill>
               </a:rPr>
               <a:t>INTRODUCTION</a:t>
             </a:r>
-            <a:endParaRPr sz="1400" b="0" i="0" u="none" strike="noStrike" cap="none" dirty="0">
+            <a:endParaRPr dirty="0">
               <a:solidFill>
                 <a:schemeClr val="lt1"/>
               </a:solidFill>
-              <a:latin typeface="Arial"/>
-              <a:ea typeface="Arial"/>
-              <a:cs typeface="Arial"/>
-              <a:sym typeface="Arial"/>
             </a:endParaRPr>
           </a:p>
         </p:txBody>
@@ -8264,8 +7839,8 @@
         </p:nvSpPr>
         <p:spPr>
           <a:xfrm>
-            <a:off x="21689673" y="17738825"/>
-            <a:ext cx="5457900" cy="548100"/>
+            <a:off x="21624323" y="28912562"/>
+            <a:ext cx="5457900" cy="547879"/>
           </a:xfrm>
           <a:prstGeom prst="rect">
             <a:avLst/>
@@ -8281,39 +7856,21 @@
           </a:bodyPr>
           <a:lstStyle/>
           <a:p>
-            <a:pPr marL="0" marR="0" lvl="0" indent="0" algn="ctr" rtl="0">
-              <a:lnSpc>
-                <a:spcPct val="100000"/>
-              </a:lnSpc>
-              <a:spcBef>
-                <a:spcPts val="0"/>
-              </a:spcBef>
-              <a:spcAft>
-                <a:spcPts val="0"/>
-              </a:spcAft>
-              <a:buClr>
-                <a:srgbClr val="000000"/>
-              </a:buClr>
+            <a:pPr algn="ctr">
               <a:buSzPts val="3075"/>
-              <a:buFont typeface="Arial"/>
-              <a:buNone/>
             </a:pPr>
             <a:r>
-              <a:rPr lang="en-US" sz="3075" b="1">
+              <a:rPr lang="en-US" sz="3075" b="1" dirty="0">
                 <a:solidFill>
                   <a:schemeClr val="lt1"/>
                 </a:solidFill>
               </a:rPr>
               <a:t>MAJOR IMPROVEMENTS</a:t>
             </a:r>
-            <a:endParaRPr sz="1400" b="0" i="0" u="none" strike="noStrike" cap="none">
+            <a:endParaRPr dirty="0">
               <a:solidFill>
                 <a:schemeClr val="lt1"/>
               </a:solidFill>
-              <a:latin typeface="Arial"/>
-              <a:ea typeface="Arial"/>
-              <a:cs typeface="Arial"/>
-              <a:sym typeface="Arial"/>
             </a:endParaRPr>
           </a:p>
         </p:txBody>
@@ -8326,8 +7883,8 @@
         </p:nvSpPr>
         <p:spPr>
           <a:xfrm>
-            <a:off x="6816425" y="8771725"/>
-            <a:ext cx="10074000" cy="7922700"/>
+            <a:off x="6641375" y="8428418"/>
+            <a:ext cx="10074000" cy="8483591"/>
           </a:xfrm>
           <a:prstGeom prst="rect">
             <a:avLst/>
@@ -8349,22 +7906,8 @@
           </a:bodyPr>
           <a:lstStyle/>
           <a:p>
-            <a:pPr marL="0" marR="0" lvl="0" indent="0" algn="l" rtl="0">
-              <a:lnSpc>
-                <a:spcPct val="100000"/>
-              </a:lnSpc>
-              <a:spcBef>
-                <a:spcPts val="0"/>
-              </a:spcBef>
-              <a:spcAft>
-                <a:spcPts val="0"/>
-              </a:spcAft>
-              <a:buClr>
-                <a:srgbClr val="000000"/>
-              </a:buClr>
+            <a:pPr>
               <a:buSzPts val="3900"/>
-              <a:buFont typeface="Arial"/>
-              <a:buNone/>
             </a:pPr>
             <a:r>
               <a:rPr lang="en-US" sz="3900" dirty="0">
@@ -8374,14 +7917,10 @@
               </a:rPr>
               <a:t>Vocabulary In Reading Study (VIRS) is a service where users can submit images, txt,, docx files, to name a few. The service is then able to extract words from these formats and provide a detailed data representation relating to these words and categorization based on multiple filters as to which those words may fall under.</a:t>
             </a:r>
-            <a:endParaRPr sz="3900" b="0" i="0" u="none" strike="noStrike" cap="none" dirty="0">
+            <a:endParaRPr sz="3900" dirty="0">
               <a:solidFill>
                 <a:schemeClr val="lt1"/>
               </a:solidFill>
-              <a:latin typeface="Arial"/>
-              <a:ea typeface="Arial"/>
-              <a:cs typeface="Arial"/>
-              <a:sym typeface="Arial"/>
             </a:endParaRPr>
           </a:p>
         </p:txBody>
@@ -8394,8 +7933,8 @@
         </p:nvSpPr>
         <p:spPr>
           <a:xfrm>
-            <a:off x="19732537" y="8831598"/>
-            <a:ext cx="10074000" cy="7922700"/>
+            <a:off x="19469412" y="8428419"/>
+            <a:ext cx="10074000" cy="8483592"/>
           </a:xfrm>
           <a:prstGeom prst="rect">
             <a:avLst/>
@@ -8417,50 +7956,8 @@
           </a:bodyPr>
           <a:lstStyle/>
           <a:p>
-            <a:pPr marL="0" marR="0" lvl="0" indent="0" algn="l" rtl="0">
-              <a:lnSpc>
-                <a:spcPct val="100000"/>
-              </a:lnSpc>
-              <a:spcBef>
-                <a:spcPts val="0"/>
-              </a:spcBef>
-              <a:spcAft>
-                <a:spcPts val="0"/>
-              </a:spcAft>
-              <a:buClr>
-                <a:srgbClr val="000000"/>
-              </a:buClr>
+            <a:pPr>
               <a:buSzPts val="3900"/>
-              <a:buFont typeface="Arial"/>
-              <a:buNone/>
-            </a:pPr>
-            <a:endParaRPr lang="en-US" sz="3900" b="0" i="0" u="none" strike="noStrike" cap="none" dirty="0">
-              <a:solidFill>
-                <a:schemeClr val="lt1"/>
-              </a:solidFill>
-              <a:latin typeface="Arial"/>
-              <a:ea typeface="Arial"/>
-              <a:cs typeface="Arial"/>
-              <a:sym typeface="Arial"/>
-            </a:endParaRPr>
-          </a:p>
-          <a:p>
-            <a:pPr marL="0" marR="0" lvl="0" indent="0" algn="l" rtl="0">
-              <a:lnSpc>
-                <a:spcPct val="100000"/>
-              </a:lnSpc>
-              <a:spcBef>
-                <a:spcPts val="0"/>
-              </a:spcBef>
-              <a:spcAft>
-                <a:spcPts val="0"/>
-              </a:spcAft>
-              <a:buClr>
-                <a:srgbClr val="000000"/>
-              </a:buClr>
-              <a:buSzPts val="3900"/>
-              <a:buFont typeface="Arial"/>
-              <a:buNone/>
             </a:pPr>
             <a:endParaRPr lang="en-US" sz="3900" dirty="0">
               <a:solidFill>
@@ -8469,50 +7966,8 @@
             </a:endParaRPr>
           </a:p>
           <a:p>
-            <a:pPr marL="0" marR="0" lvl="0" indent="0" algn="l" rtl="0">
-              <a:lnSpc>
-                <a:spcPct val="100000"/>
-              </a:lnSpc>
-              <a:spcBef>
-                <a:spcPts val="0"/>
-              </a:spcBef>
-              <a:spcAft>
-                <a:spcPts val="0"/>
-              </a:spcAft>
-              <a:buClr>
-                <a:srgbClr val="000000"/>
-              </a:buClr>
+            <a:pPr>
               <a:buSzPts val="3900"/>
-              <a:buFont typeface="Arial"/>
-              <a:buNone/>
-            </a:pPr>
-            <a:endParaRPr lang="en-US" sz="3900" b="0" i="0" u="none" strike="noStrike" cap="none" dirty="0">
-              <a:solidFill>
-                <a:schemeClr val="lt1"/>
-              </a:solidFill>
-              <a:latin typeface="Arial"/>
-              <a:ea typeface="Arial"/>
-              <a:cs typeface="Arial"/>
-              <a:sym typeface="Arial"/>
-            </a:endParaRPr>
-          </a:p>
-          <a:p>
-            <a:pPr marL="0" marR="0" lvl="0" indent="0" algn="l" rtl="0">
-              <a:lnSpc>
-                <a:spcPct val="100000"/>
-              </a:lnSpc>
-              <a:spcBef>
-                <a:spcPts val="0"/>
-              </a:spcBef>
-              <a:spcAft>
-                <a:spcPts val="0"/>
-              </a:spcAft>
-              <a:buClr>
-                <a:srgbClr val="000000"/>
-              </a:buClr>
-              <a:buSzPts val="3900"/>
-              <a:buFont typeface="Arial"/>
-              <a:buNone/>
             </a:pPr>
             <a:endParaRPr lang="en-US" sz="3900" dirty="0">
               <a:solidFill>
@@ -8521,50 +7976,8 @@
             </a:endParaRPr>
           </a:p>
           <a:p>
-            <a:pPr marL="0" marR="0" lvl="0" indent="0" algn="l" rtl="0">
-              <a:lnSpc>
-                <a:spcPct val="100000"/>
-              </a:lnSpc>
-              <a:spcBef>
-                <a:spcPts val="0"/>
-              </a:spcBef>
-              <a:spcAft>
-                <a:spcPts val="0"/>
-              </a:spcAft>
-              <a:buClr>
-                <a:srgbClr val="000000"/>
-              </a:buClr>
+            <a:pPr>
               <a:buSzPts val="3900"/>
-              <a:buFont typeface="Arial"/>
-              <a:buNone/>
-            </a:pPr>
-            <a:endParaRPr lang="en-US" sz="3900" b="0" i="0" u="none" strike="noStrike" cap="none" dirty="0">
-              <a:solidFill>
-                <a:schemeClr val="lt1"/>
-              </a:solidFill>
-              <a:latin typeface="Arial"/>
-              <a:ea typeface="Arial"/>
-              <a:cs typeface="Arial"/>
-              <a:sym typeface="Arial"/>
-            </a:endParaRPr>
-          </a:p>
-          <a:p>
-            <a:pPr marL="0" marR="0" lvl="0" indent="0" algn="l" rtl="0">
-              <a:lnSpc>
-                <a:spcPct val="100000"/>
-              </a:lnSpc>
-              <a:spcBef>
-                <a:spcPts val="0"/>
-              </a:spcBef>
-              <a:spcAft>
-                <a:spcPts val="0"/>
-              </a:spcAft>
-              <a:buClr>
-                <a:srgbClr val="000000"/>
-              </a:buClr>
-              <a:buSzPts val="3900"/>
-              <a:buFont typeface="Arial"/>
-              <a:buNone/>
             </a:pPr>
             <a:endParaRPr lang="en-US" sz="3900" dirty="0">
               <a:solidFill>
@@ -8573,42 +7986,46 @@
             </a:endParaRPr>
           </a:p>
           <a:p>
-            <a:pPr marL="0" marR="0" lvl="0" indent="0" algn="l" rtl="0">
-              <a:lnSpc>
-                <a:spcPct val="100000"/>
-              </a:lnSpc>
-              <a:spcBef>
-                <a:spcPts val="0"/>
-              </a:spcBef>
-              <a:spcAft>
-                <a:spcPts val="0"/>
-              </a:spcAft>
-              <a:buClr>
-                <a:srgbClr val="000000"/>
-              </a:buClr>
+            <a:pPr>
               <a:buSzPts val="3900"/>
-              <a:buFont typeface="Arial"/>
-              <a:buNone/>
+            </a:pPr>
+            <a:endParaRPr lang="en-US" sz="3900" dirty="0">
+              <a:solidFill>
+                <a:schemeClr val="lt1"/>
+              </a:solidFill>
+            </a:endParaRPr>
+          </a:p>
+          <a:p>
+            <a:pPr>
+              <a:buSzPts val="3900"/>
+            </a:pPr>
+            <a:endParaRPr lang="en-US" sz="3900" dirty="0">
+              <a:solidFill>
+                <a:schemeClr val="lt1"/>
+              </a:solidFill>
+            </a:endParaRPr>
+          </a:p>
+          <a:p>
+            <a:pPr>
+              <a:buSzPts val="3900"/>
+            </a:pPr>
+            <a:endParaRPr lang="en-US" sz="3900" dirty="0">
+              <a:solidFill>
+                <a:schemeClr val="lt1"/>
+              </a:solidFill>
+            </a:endParaRPr>
+          </a:p>
+          <a:p>
+            <a:pPr>
+              <a:buSzPts val="3900"/>
             </a:pPr>
             <a:r>
-              <a:rPr lang="en-US" sz="3900" b="0" i="0" u="none" strike="noStrike" cap="none" dirty="0">
-                <a:solidFill>
-                  <a:schemeClr val="lt1"/>
-                </a:solidFill>
-                <a:latin typeface="Arial"/>
-                <a:ea typeface="Arial"/>
-                <a:cs typeface="Arial"/>
-                <a:sym typeface="Arial"/>
+              <a:rPr lang="en-US" sz="3900" dirty="0">
+                <a:solidFill>
+                  <a:schemeClr val="lt1"/>
+                </a:solidFill>
               </a:rPr>
-              <a:t>1.Words do not have a </a:t>
-            </a:r>
-            <a:r>
-              <a:rPr lang="en-US" sz="3900" dirty="0">
-                <a:solidFill>
-                  <a:schemeClr val="lt1"/>
-                </a:solidFill>
-              </a:rPr>
-              <a:t>grade level attribute in which the user is able to search words based on this values. This restricts the usage of the program, delivering a more diverse platform.</a:t>
+              <a:t>1.Words do not have a grade level attribute in which the user is able to search words based on this values. This restricts the usage of the program, delivering a more diverse platform.</a:t>
             </a:r>
             <a:endParaRPr sz="3900" dirty="0">
               <a:solidFill>
@@ -8617,22 +8034,8 @@
             </a:endParaRPr>
           </a:p>
           <a:p>
-            <a:pPr marL="0" marR="0" lvl="0" indent="0" algn="l" rtl="0">
-              <a:lnSpc>
-                <a:spcPct val="100000"/>
-              </a:lnSpc>
-              <a:spcBef>
-                <a:spcPts val="0"/>
-              </a:spcBef>
-              <a:spcAft>
-                <a:spcPts val="0"/>
-              </a:spcAft>
-              <a:buClr>
-                <a:srgbClr val="000000"/>
-              </a:buClr>
+            <a:pPr>
               <a:buSzPts val="3900"/>
-              <a:buFont typeface="Arial"/>
-              <a:buNone/>
             </a:pPr>
             <a:endParaRPr sz="3900" dirty="0">
               <a:solidFill>
@@ -8641,90 +8044,26 @@
             </a:endParaRPr>
           </a:p>
           <a:p>
-            <a:pPr marL="0" marR="0" lvl="0" indent="0" algn="l" rtl="0">
-              <a:lnSpc>
-                <a:spcPct val="100000"/>
-              </a:lnSpc>
-              <a:spcBef>
-                <a:spcPts val="0"/>
-              </a:spcBef>
-              <a:spcAft>
-                <a:spcPts val="0"/>
-              </a:spcAft>
-              <a:buClr>
-                <a:srgbClr val="000000"/>
-              </a:buClr>
+            <a:pPr>
               <a:buSzPts val="3900"/>
-              <a:buFont typeface="Arial"/>
-              <a:buNone/>
             </a:pPr>
             <a:r>
-              <a:rPr lang="en-US" sz="3900" b="0" i="0" u="none" strike="noStrike" cap="none" dirty="0">
-                <a:solidFill>
-                  <a:schemeClr val="lt1"/>
-                </a:solidFill>
-                <a:latin typeface="Arial"/>
-                <a:ea typeface="Arial"/>
-                <a:cs typeface="Arial"/>
-                <a:sym typeface="Arial"/>
+              <a:rPr lang="en-US" sz="3900" dirty="0">
+                <a:solidFill>
+                  <a:schemeClr val="lt1"/>
+                </a:solidFill>
               </a:rPr>
               <a:t>2. The image, document, PDF readers are not working, depreciating the content of the site. Without these, many of the users will not longer be interested.</a:t>
             </a:r>
-            <a:endParaRPr sz="3900" b="0" i="0" u="none" strike="noStrike" cap="none" dirty="0">
+            <a:endParaRPr sz="3900" dirty="0">
               <a:solidFill>
                 <a:schemeClr val="lt1"/>
               </a:solidFill>
-              <a:latin typeface="Arial"/>
-              <a:ea typeface="Arial"/>
-              <a:cs typeface="Arial"/>
-              <a:sym typeface="Arial"/>
             </a:endParaRPr>
           </a:p>
           <a:p>
-            <a:pPr marL="0" marR="0" lvl="0" indent="0" algn="l" rtl="0">
-              <a:lnSpc>
-                <a:spcPct val="100000"/>
-              </a:lnSpc>
-              <a:spcBef>
-                <a:spcPts val="0"/>
-              </a:spcBef>
-              <a:spcAft>
-                <a:spcPts val="0"/>
-              </a:spcAft>
-              <a:buClr>
-                <a:srgbClr val="000000"/>
-              </a:buClr>
+            <a:pPr>
               <a:buSzPts val="3900"/>
-              <a:buFont typeface="Arial"/>
-              <a:buNone/>
-            </a:pPr>
-            <a:endParaRPr sz="3900" b="0" i="0" u="none" strike="noStrike" cap="none" dirty="0">
-              <a:solidFill>
-                <a:schemeClr val="lt1"/>
-              </a:solidFill>
-              <a:latin typeface="Arial"/>
-              <a:ea typeface="Arial"/>
-              <a:cs typeface="Arial"/>
-              <a:sym typeface="Arial"/>
-            </a:endParaRPr>
-          </a:p>
-          <a:p>
-            <a:pPr marL="0" marR="0" lvl="0" indent="0" algn="l" rtl="0">
-              <a:lnSpc>
-                <a:spcPct val="100000"/>
-              </a:lnSpc>
-              <a:spcBef>
-                <a:spcPts val="0"/>
-              </a:spcBef>
-              <a:spcAft>
-                <a:spcPts val="0"/>
-              </a:spcAft>
-              <a:buClr>
-                <a:srgbClr val="000000"/>
-              </a:buClr>
-              <a:buSzPts val="3900"/>
-              <a:buFont typeface="Arial"/>
-              <a:buNone/>
             </a:pPr>
             <a:endParaRPr sz="3900" dirty="0">
               <a:solidFill>
@@ -8733,22 +8072,8 @@
             </a:endParaRPr>
           </a:p>
           <a:p>
-            <a:pPr marL="0" marR="0" lvl="0" indent="0" algn="l" rtl="0">
-              <a:lnSpc>
-                <a:spcPct val="100000"/>
-              </a:lnSpc>
-              <a:spcBef>
-                <a:spcPts val="0"/>
-              </a:spcBef>
-              <a:spcAft>
-                <a:spcPts val="0"/>
-              </a:spcAft>
-              <a:buClr>
-                <a:srgbClr val="000000"/>
-              </a:buClr>
+            <a:pPr>
               <a:buSzPts val="3900"/>
-              <a:buFont typeface="Arial"/>
-              <a:buNone/>
             </a:pPr>
             <a:endParaRPr sz="3900" dirty="0">
               <a:solidFill>
@@ -8757,22 +8082,8 @@
             </a:endParaRPr>
           </a:p>
           <a:p>
-            <a:pPr marL="0" marR="0" lvl="0" indent="0" algn="l" rtl="0">
-              <a:lnSpc>
-                <a:spcPct val="100000"/>
-              </a:lnSpc>
-              <a:spcBef>
-                <a:spcPts val="0"/>
-              </a:spcBef>
-              <a:spcAft>
-                <a:spcPts val="0"/>
-              </a:spcAft>
-              <a:buClr>
-                <a:srgbClr val="000000"/>
-              </a:buClr>
+            <a:pPr>
               <a:buSzPts val="3900"/>
-              <a:buFont typeface="Arial"/>
-              <a:buNone/>
             </a:pPr>
             <a:endParaRPr sz="3900" dirty="0">
               <a:solidFill>
@@ -8781,22 +8092,8 @@
             </a:endParaRPr>
           </a:p>
           <a:p>
-            <a:pPr marL="0" marR="0" lvl="0" indent="0" algn="l" rtl="0">
-              <a:lnSpc>
-                <a:spcPct val="100000"/>
-              </a:lnSpc>
-              <a:spcBef>
-                <a:spcPts val="0"/>
-              </a:spcBef>
-              <a:spcAft>
-                <a:spcPts val="0"/>
-              </a:spcAft>
-              <a:buClr>
-                <a:srgbClr val="000000"/>
-              </a:buClr>
+            <a:pPr>
               <a:buSzPts val="3900"/>
-              <a:buFont typeface="Arial"/>
-              <a:buNone/>
             </a:pPr>
             <a:endParaRPr sz="3900" dirty="0">
               <a:solidFill>
@@ -8805,22 +8102,8 @@
             </a:endParaRPr>
           </a:p>
           <a:p>
-            <a:pPr marL="0" marR="0" lvl="0" indent="0" algn="l" rtl="0">
-              <a:lnSpc>
-                <a:spcPct val="100000"/>
-              </a:lnSpc>
-              <a:spcBef>
-                <a:spcPts val="0"/>
-              </a:spcBef>
-              <a:spcAft>
-                <a:spcPts val="0"/>
-              </a:spcAft>
-              <a:buClr>
-                <a:srgbClr val="000000"/>
-              </a:buClr>
+            <a:pPr>
               <a:buSzPts val="3900"/>
-              <a:buFont typeface="Arial"/>
-              <a:buNone/>
             </a:pPr>
             <a:endParaRPr sz="3900" dirty="0">
               <a:solidFill>
@@ -8829,22 +8112,18 @@
             </a:endParaRPr>
           </a:p>
           <a:p>
-            <a:pPr marL="0" marR="0" lvl="0" indent="0" algn="l" rtl="0">
-              <a:lnSpc>
-                <a:spcPct val="100000"/>
-              </a:lnSpc>
-              <a:spcBef>
-                <a:spcPts val="0"/>
-              </a:spcBef>
-              <a:spcAft>
-                <a:spcPts val="0"/>
-              </a:spcAft>
-              <a:buClr>
-                <a:srgbClr val="000000"/>
-              </a:buClr>
+            <a:pPr>
               <a:buSzPts val="3900"/>
-              <a:buFont typeface="Arial"/>
-              <a:buNone/>
+            </a:pPr>
+            <a:endParaRPr sz="3900" dirty="0">
+              <a:solidFill>
+                <a:schemeClr val="lt1"/>
+              </a:solidFill>
+            </a:endParaRPr>
+          </a:p>
+          <a:p>
+            <a:pPr>
+              <a:buSzPts val="3900"/>
             </a:pPr>
             <a:endParaRPr sz="3900" dirty="0">
               <a:solidFill>
@@ -8862,7 +8141,7 @@
         </p:nvSpPr>
         <p:spPr>
           <a:xfrm>
-            <a:off x="32648650" y="8771725"/>
+            <a:off x="32385525" y="8464011"/>
             <a:ext cx="10074000" cy="8448000"/>
           </a:xfrm>
           <a:prstGeom prst="rect">
@@ -8885,19 +8164,7 @@
           </a:bodyPr>
           <a:lstStyle/>
           <a:p>
-            <a:pPr marL="571500" marR="0" lvl="0" indent="-571500" algn="l" rtl="0">
-              <a:lnSpc>
-                <a:spcPct val="100000"/>
-              </a:lnSpc>
-              <a:spcBef>
-                <a:spcPts val="0"/>
-              </a:spcBef>
-              <a:spcAft>
-                <a:spcPts val="0"/>
-              </a:spcAft>
-              <a:buClr>
-                <a:srgbClr val="000000"/>
-              </a:buClr>
+            <a:pPr marL="571472" indent="-571472">
               <a:buSzPts val="3900"/>
               <a:buFont typeface="Arial" panose="020B0604020202020204" pitchFamily="34" charset="0"/>
               <a:buChar char="•"/>
@@ -8909,19 +8176,7 @@
             </a:endParaRPr>
           </a:p>
           <a:p>
-            <a:pPr marL="571500" marR="0" lvl="0" indent="-571500" algn="l" rtl="0">
-              <a:lnSpc>
-                <a:spcPct val="100000"/>
-              </a:lnSpc>
-              <a:spcBef>
-                <a:spcPts val="0"/>
-              </a:spcBef>
-              <a:spcAft>
-                <a:spcPts val="0"/>
-              </a:spcAft>
-              <a:buClr>
-                <a:srgbClr val="000000"/>
-              </a:buClr>
+            <a:pPr marL="571472" indent="-571472">
               <a:buSzPts val="3900"/>
               <a:buFont typeface="Arial" panose="020B0604020202020204" pitchFamily="34" charset="0"/>
               <a:buChar char="•"/>
@@ -8936,19 +8191,7 @@
             </a:r>
           </a:p>
           <a:p>
-            <a:pPr marL="571500" marR="0" lvl="0" indent="-571500" algn="l" rtl="0">
-              <a:lnSpc>
-                <a:spcPct val="100000"/>
-              </a:lnSpc>
-              <a:spcBef>
-                <a:spcPts val="0"/>
-              </a:spcBef>
-              <a:spcAft>
-                <a:spcPts val="0"/>
-              </a:spcAft>
-              <a:buClr>
-                <a:srgbClr val="000000"/>
-              </a:buClr>
+            <a:pPr marL="571472" indent="-571472">
               <a:buSzPts val="3900"/>
               <a:buFont typeface="Arial" panose="020B0604020202020204" pitchFamily="34" charset="0"/>
               <a:buChar char="•"/>
@@ -8960,19 +8203,7 @@
             </a:endParaRPr>
           </a:p>
           <a:p>
-            <a:pPr marL="571500" marR="0" lvl="0" indent="-571500" algn="l" rtl="0">
-              <a:lnSpc>
-                <a:spcPct val="100000"/>
-              </a:lnSpc>
-              <a:spcBef>
-                <a:spcPts val="0"/>
-              </a:spcBef>
-              <a:spcAft>
-                <a:spcPts val="0"/>
-              </a:spcAft>
-              <a:buClr>
-                <a:srgbClr val="000000"/>
-              </a:buClr>
+            <a:pPr marL="571472" indent="-571472">
               <a:buSzPts val="3900"/>
               <a:buFont typeface="Arial" panose="020B0604020202020204" pitchFamily="34" charset="0"/>
               <a:buChar char="•"/>
@@ -8987,19 +8218,7 @@
             </a:r>
           </a:p>
           <a:p>
-            <a:pPr marL="571500" marR="0" lvl="0" indent="-571500" algn="l" rtl="0">
-              <a:lnSpc>
-                <a:spcPct val="100000"/>
-              </a:lnSpc>
-              <a:spcBef>
-                <a:spcPts val="0"/>
-              </a:spcBef>
-              <a:spcAft>
-                <a:spcPts val="0"/>
-              </a:spcAft>
-              <a:buClr>
-                <a:srgbClr val="000000"/>
-              </a:buClr>
+            <a:pPr marL="571472" indent="-571472">
               <a:buSzPts val="3900"/>
               <a:buFont typeface="Arial" panose="020B0604020202020204" pitchFamily="34" charset="0"/>
               <a:buChar char="•"/>
@@ -9011,19 +8230,7 @@
             </a:endParaRPr>
           </a:p>
           <a:p>
-            <a:pPr marL="571500" marR="0" lvl="0" indent="-571500" algn="l" rtl="0">
-              <a:lnSpc>
-                <a:spcPct val="100000"/>
-              </a:lnSpc>
-              <a:spcBef>
-                <a:spcPts val="0"/>
-              </a:spcBef>
-              <a:spcAft>
-                <a:spcPts val="0"/>
-              </a:spcAft>
-              <a:buClr>
-                <a:srgbClr val="000000"/>
-              </a:buClr>
+            <a:pPr marL="571472" indent="-571472">
               <a:buSzPts val="3900"/>
               <a:buFont typeface="Arial" panose="020B0604020202020204" pitchFamily="34" charset="0"/>
               <a:buChar char="•"/>
@@ -9038,19 +8245,7 @@
             </a:r>
           </a:p>
           <a:p>
-            <a:pPr marL="571500" marR="0" lvl="0" indent="-571500" algn="l" rtl="0">
-              <a:lnSpc>
-                <a:spcPct val="100000"/>
-              </a:lnSpc>
-              <a:spcBef>
-                <a:spcPts val="0"/>
-              </a:spcBef>
-              <a:spcAft>
-                <a:spcPts val="0"/>
-              </a:spcAft>
-              <a:buClr>
-                <a:srgbClr val="000000"/>
-              </a:buClr>
+            <a:pPr marL="571472" indent="-571472">
               <a:buSzPts val="3900"/>
               <a:buFont typeface="Arial" panose="020B0604020202020204" pitchFamily="34" charset="0"/>
               <a:buChar char="•"/>
@@ -9062,19 +8257,7 @@
             </a:endParaRPr>
           </a:p>
           <a:p>
-            <a:pPr marL="571500" marR="0" lvl="0" indent="-571500" algn="l" rtl="0">
-              <a:lnSpc>
-                <a:spcPct val="100000"/>
-              </a:lnSpc>
-              <a:spcBef>
-                <a:spcPts val="0"/>
-              </a:spcBef>
-              <a:spcAft>
-                <a:spcPts val="0"/>
-              </a:spcAft>
-              <a:buClr>
-                <a:srgbClr val="000000"/>
-              </a:buClr>
+            <a:pPr marL="571472" indent="-571472">
               <a:buSzPts val="3900"/>
               <a:buFont typeface="Arial" panose="020B0604020202020204" pitchFamily="34" charset="0"/>
               <a:buChar char="•"/>
@@ -9089,19 +8272,7 @@
             </a:r>
           </a:p>
           <a:p>
-            <a:pPr marL="571500" marR="0" lvl="0" indent="-571500" algn="l" rtl="0">
-              <a:lnSpc>
-                <a:spcPct val="100000"/>
-              </a:lnSpc>
-              <a:spcBef>
-                <a:spcPts val="0"/>
-              </a:spcBef>
-              <a:spcAft>
-                <a:spcPts val="0"/>
-              </a:spcAft>
-              <a:buClr>
-                <a:srgbClr val="000000"/>
-              </a:buClr>
+            <a:pPr marL="571472" indent="-571472">
               <a:buSzPts val="3900"/>
               <a:buFont typeface="Arial" panose="020B0604020202020204" pitchFamily="34" charset="0"/>
               <a:buChar char="•"/>
@@ -9122,7 +8293,7 @@
         </p:nvSpPr>
         <p:spPr>
           <a:xfrm>
-            <a:off x="6797024" y="24773905"/>
+            <a:off x="10648266" y="24852704"/>
             <a:ext cx="10093375" cy="3229382"/>
           </a:xfrm>
           <a:prstGeom prst="rect">
@@ -9145,22 +8316,8 @@
           </a:bodyPr>
           <a:lstStyle/>
           <a:p>
-            <a:pPr marL="0" marR="0" lvl="0" indent="0" algn="l" rtl="0">
-              <a:lnSpc>
-                <a:spcPct val="100000"/>
-              </a:lnSpc>
-              <a:spcBef>
-                <a:spcPts val="0"/>
-              </a:spcBef>
-              <a:spcAft>
-                <a:spcPts val="0"/>
-              </a:spcAft>
-              <a:buClr>
-                <a:srgbClr val="000000"/>
-              </a:buClr>
+            <a:pPr>
               <a:buSzPts val="3900"/>
-              <a:buFont typeface="Arial"/>
-              <a:buNone/>
             </a:pPr>
             <a:r>
               <a:rPr lang="en-US" sz="3900" dirty="0">
@@ -9172,22 +8329,8 @@
             </a:r>
           </a:p>
           <a:p>
-            <a:pPr marL="0" marR="0" lvl="0" indent="0" algn="l" rtl="0">
-              <a:lnSpc>
-                <a:spcPct val="100000"/>
-              </a:lnSpc>
-              <a:spcBef>
-                <a:spcPts val="0"/>
-              </a:spcBef>
-              <a:spcAft>
-                <a:spcPts val="0"/>
-              </a:spcAft>
-              <a:buClr>
-                <a:srgbClr val="000000"/>
-              </a:buClr>
+            <a:pPr>
               <a:buSzPts val="3900"/>
-              <a:buFont typeface="Arial"/>
-              <a:buNone/>
             </a:pPr>
             <a:r>
               <a:rPr lang="en-US" sz="3900" dirty="0">
@@ -9199,22 +8342,8 @@
             </a:r>
           </a:p>
           <a:p>
-            <a:pPr marL="0" marR="0" lvl="0" indent="0" algn="l" rtl="0">
-              <a:lnSpc>
-                <a:spcPct val="100000"/>
-              </a:lnSpc>
-              <a:spcBef>
-                <a:spcPts val="0"/>
-              </a:spcBef>
-              <a:spcAft>
-                <a:spcPts val="0"/>
-              </a:spcAft>
-              <a:buClr>
-                <a:srgbClr val="000000"/>
-              </a:buClr>
+            <a:pPr>
               <a:buSzPts val="3900"/>
-              <a:buFont typeface="Arial"/>
-              <a:buNone/>
             </a:pPr>
             <a:r>
               <a:rPr lang="en-US" sz="3900" dirty="0">
@@ -9226,22 +8355,8 @@
             </a:r>
           </a:p>
           <a:p>
-            <a:pPr marL="0" marR="0" lvl="0" indent="0" algn="l" rtl="0">
-              <a:lnSpc>
-                <a:spcPct val="100000"/>
-              </a:lnSpc>
-              <a:spcBef>
-                <a:spcPts val="0"/>
-              </a:spcBef>
-              <a:spcAft>
-                <a:spcPts val="0"/>
-              </a:spcAft>
-              <a:buClr>
-                <a:srgbClr val="000000"/>
-              </a:buClr>
+            <a:pPr>
               <a:buSzPts val="3900"/>
-              <a:buFont typeface="Arial"/>
-              <a:buNone/>
             </a:pPr>
             <a:r>
               <a:rPr lang="en-US" sz="3900" dirty="0">
@@ -9262,7 +8377,7 @@
         </p:nvSpPr>
         <p:spPr>
           <a:xfrm>
-            <a:off x="18832525" y="25100113"/>
+            <a:off x="18569412" y="36375813"/>
             <a:ext cx="11874000" cy="3508623"/>
           </a:xfrm>
           <a:prstGeom prst="rect">
@@ -9281,22 +8396,8 @@
           </a:bodyPr>
           <a:lstStyle/>
           <a:p>
-            <a:pPr marL="0" marR="0" lvl="0" indent="0" algn="l" rtl="0">
-              <a:lnSpc>
-                <a:spcPct val="100000"/>
-              </a:lnSpc>
-              <a:spcBef>
-                <a:spcPts val="0"/>
-              </a:spcBef>
-              <a:spcAft>
-                <a:spcPts val="0"/>
-              </a:spcAft>
-              <a:buClr>
-                <a:srgbClr val="000000"/>
-              </a:buClr>
+            <a:pPr>
               <a:buSzPts val="3900"/>
-              <a:buFont typeface="Arial"/>
-              <a:buNone/>
             </a:pPr>
             <a:r>
               <a:rPr lang="en-US" sz="3600" dirty="0">
@@ -9322,15 +8423,6 @@
               </a:rPr>
               <a:t> interface. </a:t>
             </a:r>
-            <a:endParaRPr lang="en-US" sz="3600" b="0" i="0" u="none" strike="noStrike" cap="none" dirty="0">
-              <a:solidFill>
-                <a:schemeClr val="lt1"/>
-              </a:solidFill>
-              <a:latin typeface="Arial"/>
-              <a:ea typeface="Arial"/>
-              <a:cs typeface="Arial"/>
-              <a:sym typeface="Arial"/>
-            </a:endParaRPr>
           </a:p>
         </p:txBody>
       </p:sp>
@@ -9342,8 +8434,8 @@
         </p:nvSpPr>
         <p:spPr>
           <a:xfrm>
-            <a:off x="32648650" y="18725600"/>
-            <a:ext cx="10074000" cy="11103300"/>
+            <a:off x="32385525" y="29682125"/>
+            <a:ext cx="10074000" cy="8448000"/>
           </a:xfrm>
           <a:prstGeom prst="rect">
             <a:avLst/>
@@ -9365,22 +8457,8 @@
           </a:bodyPr>
           <a:lstStyle/>
           <a:p>
-            <a:pPr marL="0" marR="0" lvl="0" indent="0" algn="l" rtl="0">
-              <a:lnSpc>
-                <a:spcPct val="100000"/>
-              </a:lnSpc>
-              <a:spcBef>
-                <a:spcPts val="0"/>
-              </a:spcBef>
-              <a:spcAft>
-                <a:spcPts val="0"/>
-              </a:spcAft>
-              <a:buClr>
-                <a:srgbClr val="000000"/>
-              </a:buClr>
+            <a:pPr>
               <a:buSzPts val="3900"/>
-              <a:buFont typeface="Arial"/>
-              <a:buNone/>
             </a:pPr>
             <a:r>
               <a:rPr lang="en-US" sz="3900" dirty="0">
@@ -9390,14 +8468,10 @@
               </a:rPr>
               <a:t>Being the lead for this project, I received exposure to taking in the responsibility from a whole team. The CI/CD environment we developed on was thoroughly executed with every sprint. Our team was able to learn software development and QA roles in this semester while practicing optimal software development principles. VIRS is now a more complete application and the range of its users will now be expanded.</a:t>
             </a:r>
-            <a:endParaRPr sz="3900" b="0" i="0" u="none" strike="noStrike" cap="none" dirty="0">
+            <a:endParaRPr sz="3900" dirty="0">
               <a:solidFill>
                 <a:schemeClr val="lt1"/>
               </a:solidFill>
-              <a:latin typeface="Arial"/>
-              <a:ea typeface="Arial"/>
-              <a:cs typeface="Arial"/>
-              <a:sym typeface="Arial"/>
             </a:endParaRPr>
           </a:p>
         </p:txBody>
@@ -9424,7 +8498,7 @@
         </p:blipFill>
         <p:spPr>
           <a:xfrm>
-            <a:off x="18651636" y="18424827"/>
+            <a:off x="18255264" y="29889668"/>
             <a:ext cx="12235777" cy="5892662"/>
           </a:xfrm>
           <a:prstGeom prst="rect">
@@ -9455,8 +8529,8 @@
         </p:blipFill>
         <p:spPr bwMode="auto">
           <a:xfrm>
-            <a:off x="7029950" y="18321375"/>
-            <a:ext cx="9482000" cy="5562000"/>
+            <a:off x="10335832" y="18174938"/>
+            <a:ext cx="10718241" cy="6287161"/>
           </a:xfrm>
           <a:prstGeom prst="rect">
             <a:avLst/>
@@ -9474,6 +8548,244 @@
           </a:effectLst>
         </p:spPr>
       </p:pic>
+      <p:pic>
+        <p:nvPicPr>
+          <p:cNvPr id="3" name="Picture 2">
+            <a:extLst>
+              <a:ext uri="{FF2B5EF4-FFF2-40B4-BE49-F238E27FC236}">
+                <a16:creationId xmlns:a16="http://schemas.microsoft.com/office/drawing/2014/main" id="{720CCDFA-C85C-43EA-73FE-D43581A9555F}"/>
+              </a:ext>
+            </a:extLst>
+          </p:cNvPr>
+          <p:cNvPicPr>
+            <a:picLocks noChangeAspect="1"/>
+          </p:cNvPicPr>
+          <p:nvPr/>
+        </p:nvPicPr>
+        <p:blipFill>
+          <a:blip r:embed="rId7"/>
+          <a:stretch>
+            <a:fillRect/>
+          </a:stretch>
+        </p:blipFill>
+        <p:spPr>
+          <a:xfrm>
+            <a:off x="25224773" y="18174938"/>
+            <a:ext cx="14126014" cy="6367191"/>
+          </a:xfrm>
+          <a:prstGeom prst="rect">
+            <a:avLst/>
+          </a:prstGeom>
+        </p:spPr>
+      </p:pic>
+      <p:sp>
+        <p:nvSpPr>
+          <p:cNvPr id="4" name="Google Shape;95;p6">
+            <a:extLst>
+              <a:ext uri="{FF2B5EF4-FFF2-40B4-BE49-F238E27FC236}">
+                <a16:creationId xmlns:a16="http://schemas.microsoft.com/office/drawing/2014/main" id="{4DFF2238-67EA-4F30-C644-88596802744A}"/>
+              </a:ext>
+            </a:extLst>
+          </p:cNvPr>
+          <p:cNvSpPr/>
+          <p:nvPr/>
+        </p:nvSpPr>
+        <p:spPr>
+          <a:xfrm>
+            <a:off x="25224773" y="25003684"/>
+            <a:ext cx="14126013" cy="3229382"/>
+          </a:xfrm>
+          <a:prstGeom prst="rect">
+            <a:avLst/>
+          </a:prstGeom>
+          <a:noFill/>
+          <a:ln w="28575" cap="flat" cmpd="sng">
+            <a:solidFill>
+              <a:schemeClr val="lt1"/>
+            </a:solidFill>
+            <a:prstDash val="solid"/>
+            <a:round/>
+            <a:headEnd type="none" w="sm" len="sm"/>
+            <a:tailEnd type="none" w="sm" len="sm"/>
+          </a:ln>
+        </p:spPr>
+        <p:txBody>
+          <a:bodyPr spcFirstLastPara="1" wrap="square" lIns="91425" tIns="91425" rIns="91425" bIns="91425" anchor="ctr" anchorCtr="0">
+            <a:noAutofit/>
+          </a:bodyPr>
+          <a:lstStyle/>
+          <a:p>
+            <a:pPr>
+              <a:buSzPts val="3900"/>
+            </a:pPr>
+            <a:r>
+              <a:rPr lang="en-US" sz="3900" dirty="0">
+                <a:solidFill>
+                  <a:schemeClr val="lt1"/>
+                </a:solidFill>
+              </a:rPr>
+              <a:t>The figure above shows the life-cycle of the “Search word list functionality”. In the </a:t>
+            </a:r>
+            <a:r>
+              <a:rPr lang="en-US" sz="3900" dirty="0" err="1">
+                <a:solidFill>
+                  <a:schemeClr val="lt1"/>
+                </a:solidFill>
+              </a:rPr>
+              <a:t>wordRepository</a:t>
+            </a:r>
+            <a:r>
+              <a:rPr lang="en-US" sz="3900" dirty="0">
+                <a:solidFill>
+                  <a:schemeClr val="lt1"/>
+                </a:solidFill>
+              </a:rPr>
+              <a:t>, the interface  extends </a:t>
+            </a:r>
+            <a:r>
+              <a:rPr lang="en-US" sz="3900" dirty="0" err="1">
+                <a:solidFill>
+                  <a:schemeClr val="lt1"/>
+                </a:solidFill>
+              </a:rPr>
+              <a:t>JPAReposiitory</a:t>
+            </a:r>
+            <a:r>
+              <a:rPr lang="en-US" sz="3900" dirty="0">
+                <a:solidFill>
+                  <a:schemeClr val="lt1"/>
+                </a:solidFill>
+              </a:rPr>
+              <a:t> and it uses the Word class to build the query with the pertaining arguments</a:t>
+            </a:r>
+          </a:p>
+        </p:txBody>
+      </p:sp>
+      <p:sp>
+        <p:nvSpPr>
+          <p:cNvPr id="7" name="Google Shape;83;p6">
+            <a:extLst>
+              <a:ext uri="{FF2B5EF4-FFF2-40B4-BE49-F238E27FC236}">
+                <a16:creationId xmlns:a16="http://schemas.microsoft.com/office/drawing/2014/main" id="{24AA2C62-F761-F6BD-0174-0D8905D7F29B}"/>
+              </a:ext>
+            </a:extLst>
+          </p:cNvPr>
+          <p:cNvSpPr txBox="1"/>
+          <p:nvPr/>
+        </p:nvSpPr>
+        <p:spPr>
+          <a:xfrm>
+            <a:off x="30230380" y="17459890"/>
+            <a:ext cx="4114800" cy="548648"/>
+          </a:xfrm>
+          <a:prstGeom prst="rect">
+            <a:avLst/>
+          </a:prstGeom>
+          <a:noFill/>
+          <a:ln>
+            <a:noFill/>
+          </a:ln>
+        </p:spPr>
+        <p:txBody>
+          <a:bodyPr spcFirstLastPara="1" wrap="square" lIns="73975" tIns="36975" rIns="73975" bIns="36975" anchor="t" anchorCtr="0">
+            <a:spAutoFit/>
+          </a:bodyPr>
+          <a:lstStyle/>
+          <a:p>
+            <a:pPr algn="ctr">
+              <a:buSzPts val="3075"/>
+            </a:pPr>
+            <a:r>
+              <a:rPr lang="en-US" sz="3080" b="1" dirty="0">
+                <a:solidFill>
+                  <a:schemeClr val="lt1"/>
+                </a:solidFill>
+              </a:rPr>
+              <a:t>Implementation</a:t>
+            </a:r>
+            <a:endParaRPr sz="3080" b="1" dirty="0">
+              <a:solidFill>
+                <a:schemeClr val="lt1"/>
+              </a:solidFill>
+            </a:endParaRPr>
+          </a:p>
+        </p:txBody>
+      </p:sp>
+      <p:pic>
+        <p:nvPicPr>
+          <p:cNvPr id="9" name="Picture 8">
+            <a:extLst>
+              <a:ext uri="{FF2B5EF4-FFF2-40B4-BE49-F238E27FC236}">
+                <a16:creationId xmlns:a16="http://schemas.microsoft.com/office/drawing/2014/main" id="{5CB55E1F-B2FA-57D5-3A20-E6810E006C62}"/>
+              </a:ext>
+            </a:extLst>
+          </p:cNvPr>
+          <p:cNvPicPr>
+            <a:picLocks noChangeAspect="1"/>
+          </p:cNvPicPr>
+          <p:nvPr/>
+        </p:nvPicPr>
+        <p:blipFill>
+          <a:blip r:embed="rId8"/>
+          <a:stretch>
+            <a:fillRect/>
+          </a:stretch>
+        </p:blipFill>
+        <p:spPr>
+          <a:xfrm>
+            <a:off x="8175212" y="29362829"/>
+            <a:ext cx="7006325" cy="12839002"/>
+          </a:xfrm>
+          <a:prstGeom prst="rect">
+            <a:avLst/>
+          </a:prstGeom>
+        </p:spPr>
+      </p:pic>
+      <p:sp>
+        <p:nvSpPr>
+          <p:cNvPr id="12" name="Google Shape;83;p6">
+            <a:extLst>
+              <a:ext uri="{FF2B5EF4-FFF2-40B4-BE49-F238E27FC236}">
+                <a16:creationId xmlns:a16="http://schemas.microsoft.com/office/drawing/2014/main" id="{8A47EE75-5C48-4AF9-7373-327941BB1C0A}"/>
+              </a:ext>
+            </a:extLst>
+          </p:cNvPr>
+          <p:cNvSpPr txBox="1"/>
+          <p:nvPr/>
+        </p:nvSpPr>
+        <p:spPr>
+          <a:xfrm>
+            <a:off x="9226621" y="28619082"/>
+            <a:ext cx="4114800" cy="547879"/>
+          </a:xfrm>
+          <a:prstGeom prst="rect">
+            <a:avLst/>
+          </a:prstGeom>
+          <a:noFill/>
+          <a:ln>
+            <a:noFill/>
+          </a:ln>
+        </p:spPr>
+        <p:txBody>
+          <a:bodyPr spcFirstLastPara="1" wrap="square" lIns="73975" tIns="36975" rIns="73975" bIns="36975" anchor="t" anchorCtr="0">
+            <a:spAutoFit/>
+          </a:bodyPr>
+          <a:lstStyle/>
+          <a:p>
+            <a:pPr algn="ctr">
+              <a:buSzPts val="3075"/>
+            </a:pPr>
+            <a:r>
+              <a:rPr lang="en-US" sz="3075" b="1" dirty="0">
+                <a:solidFill>
+                  <a:schemeClr val="lt1"/>
+                </a:solidFill>
+              </a:rPr>
+              <a:t>Class Diagram</a:t>
+            </a:r>
+          </a:p>
+        </p:txBody>
+      </p:sp>
     </p:spTree>
   </p:cSld>
   <p:clrMapOvr>

</xml_diff>